<commit_message>
Update Session 2 materials
Updated the Lecture Slides and Rmarkdown document. Also added a student script to follow along.
</commit_message>
<xml_diff>
--- a/2_data_wrangling/Session 2.pptx
+++ b/2_data_wrangling/Session 2.pptx
@@ -110,6 +110,11 @@
       </a:defRPr>
     </a:lvl9pPr>
   </p:defaultTextStyle>
+  <p:extLst>
+    <p:ext uri="{EFAFB233-063F-42B5-8137-9DF3F51BA10A}">
+      <p15:sldGuideLst xmlns:p15="http://schemas.microsoft.com/office/powerpoint/2012/main"/>
+    </p:ext>
+  </p:extLst>
 </p:presentation>
 </file>
 
@@ -195,7 +200,7 @@
           <a:p>
             <a:fld id="{D75DD2D9-9398-4CDE-8633-57FB60D8BFD9}" type="datetimeFigureOut">
               <a:rPr lang="en-US" smtClean="0"/>
-              <a:t>1/4/2021</a:t>
+              <a:t>1/8/2021</a:t>
             </a:fld>
             <a:endParaRPr lang="en-US"/>
           </a:p>
@@ -1070,7 +1075,7 @@
             <a:fld id="{B61BEF0D-F0BB-DE4B-95CE-6DB70DBA9567}" type="datetimeFigureOut">
               <a:rPr lang="en-US" dirty="0"/>
               <a:pPr/>
-              <a:t>1/4/2021</a:t>
+              <a:t>1/8/2021</a:t>
             </a:fld>
             <a:endParaRPr lang="en-US" dirty="0"/>
           </a:p>
@@ -1317,7 +1322,7 @@
             <a:fld id="{B61BEF0D-F0BB-DE4B-95CE-6DB70DBA9567}" type="datetimeFigureOut">
               <a:rPr lang="en-US" dirty="0"/>
               <a:pPr/>
-              <a:t>1/4/2021</a:t>
+              <a:t>1/8/2021</a:t>
             </a:fld>
             <a:endParaRPr lang="en-US" dirty="0"/>
           </a:p>
@@ -1622,7 +1627,7 @@
             <a:fld id="{B61BEF0D-F0BB-DE4B-95CE-6DB70DBA9567}" type="datetimeFigureOut">
               <a:rPr lang="en-US" dirty="0"/>
               <a:pPr/>
-              <a:t>1/4/2021</a:t>
+              <a:t>1/8/2021</a:t>
             </a:fld>
             <a:endParaRPr lang="en-US" dirty="0"/>
           </a:p>
@@ -1937,7 +1942,7 @@
             <a:fld id="{B61BEF0D-F0BB-DE4B-95CE-6DB70DBA9567}" type="datetimeFigureOut">
               <a:rPr lang="en-US" dirty="0"/>
               <a:pPr/>
-              <a:t>1/4/2021</a:t>
+              <a:t>1/8/2021</a:t>
             </a:fld>
             <a:endParaRPr lang="en-US" dirty="0"/>
           </a:p>
@@ -2236,7 +2241,7 @@
             <a:fld id="{B61BEF0D-F0BB-DE4B-95CE-6DB70DBA9567}" type="datetimeFigureOut">
               <a:rPr lang="en-US" dirty="0"/>
               <a:pPr/>
-              <a:t>1/4/2021</a:t>
+              <a:t>1/8/2021</a:t>
             </a:fld>
             <a:endParaRPr lang="en-US" dirty="0"/>
           </a:p>
@@ -2600,7 +2605,7 @@
             <a:fld id="{B61BEF0D-F0BB-DE4B-95CE-6DB70DBA9567}" type="datetimeFigureOut">
               <a:rPr lang="en-US" dirty="0"/>
               <a:pPr/>
-              <a:t>1/4/2021</a:t>
+              <a:t>1/8/2021</a:t>
             </a:fld>
             <a:endParaRPr lang="en-US" dirty="0"/>
           </a:p>
@@ -2771,7 +2776,7 @@
             <a:fld id="{B61BEF0D-F0BB-DE4B-95CE-6DB70DBA9567}" type="datetimeFigureOut">
               <a:rPr lang="en-US" dirty="0"/>
               <a:pPr/>
-              <a:t>1/4/2021</a:t>
+              <a:t>1/8/2021</a:t>
             </a:fld>
             <a:endParaRPr lang="en-US" dirty="0"/>
           </a:p>
@@ -2948,7 +2953,7 @@
             <a:fld id="{B61BEF0D-F0BB-DE4B-95CE-6DB70DBA9567}" type="datetimeFigureOut">
               <a:rPr lang="en-US" dirty="0"/>
               <a:pPr/>
-              <a:t>1/4/2021</a:t>
+              <a:t>1/8/2021</a:t>
             </a:fld>
             <a:endParaRPr lang="en-US" dirty="0"/>
           </a:p>
@@ -3125,7 +3130,7 @@
             <a:fld id="{B61BEF0D-F0BB-DE4B-95CE-6DB70DBA9567}" type="datetimeFigureOut">
               <a:rPr lang="en-US" dirty="0"/>
               <a:pPr/>
-              <a:t>1/4/2021</a:t>
+              <a:t>1/8/2021</a:t>
             </a:fld>
             <a:endParaRPr lang="en-US" dirty="0"/>
           </a:p>
@@ -3372,7 +3377,7 @@
             <a:fld id="{B61BEF0D-F0BB-DE4B-95CE-6DB70DBA9567}" type="datetimeFigureOut">
               <a:rPr lang="en-US" dirty="0"/>
               <a:pPr/>
-              <a:t>1/4/2021</a:t>
+              <a:t>1/8/2021</a:t>
             </a:fld>
             <a:endParaRPr lang="en-US" dirty="0"/>
           </a:p>
@@ -3605,7 +3610,7 @@
             <a:fld id="{B61BEF0D-F0BB-DE4B-95CE-6DB70DBA9567}" type="datetimeFigureOut">
               <a:rPr lang="en-US" dirty="0"/>
               <a:pPr/>
-              <a:t>1/4/2021</a:t>
+              <a:t>1/8/2021</a:t>
             </a:fld>
             <a:endParaRPr lang="en-US" dirty="0"/>
           </a:p>
@@ -3984,7 +3989,7 @@
             <a:fld id="{B61BEF0D-F0BB-DE4B-95CE-6DB70DBA9567}" type="datetimeFigureOut">
               <a:rPr lang="en-US" dirty="0"/>
               <a:pPr/>
-              <a:t>1/4/2021</a:t>
+              <a:t>1/8/2021</a:t>
             </a:fld>
             <a:endParaRPr lang="en-US" dirty="0"/>
           </a:p>
@@ -4099,7 +4104,7 @@
             <a:fld id="{B61BEF0D-F0BB-DE4B-95CE-6DB70DBA9567}" type="datetimeFigureOut">
               <a:rPr lang="en-US" dirty="0"/>
               <a:pPr/>
-              <a:t>1/4/2021</a:t>
+              <a:t>1/8/2021</a:t>
             </a:fld>
             <a:endParaRPr lang="en-US" dirty="0"/>
           </a:p>
@@ -4191,7 +4196,7 @@
             <a:fld id="{B61BEF0D-F0BB-DE4B-95CE-6DB70DBA9567}" type="datetimeFigureOut">
               <a:rPr lang="en-US" dirty="0"/>
               <a:pPr/>
-              <a:t>1/4/2021</a:t>
+              <a:t>1/8/2021</a:t>
             </a:fld>
             <a:endParaRPr lang="en-US" dirty="0"/>
           </a:p>
@@ -4443,7 +4448,7 @@
             <a:fld id="{B61BEF0D-F0BB-DE4B-95CE-6DB70DBA9567}" type="datetimeFigureOut">
               <a:rPr lang="en-US" dirty="0"/>
               <a:pPr/>
-              <a:t>1/4/2021</a:t>
+              <a:t>1/8/2021</a:t>
             </a:fld>
             <a:endParaRPr lang="en-US" dirty="0"/>
           </a:p>
@@ -4723,7 +4728,7 @@
             <a:fld id="{B61BEF0D-F0BB-DE4B-95CE-6DB70DBA9567}" type="datetimeFigureOut">
               <a:rPr lang="en-US" dirty="0"/>
               <a:pPr/>
-              <a:t>1/4/2021</a:t>
+              <a:t>1/8/2021</a:t>
             </a:fld>
             <a:endParaRPr lang="en-US" dirty="0"/>
           </a:p>
@@ -5125,7 +5130,7 @@
             <a:fld id="{B61BEF0D-F0BB-DE4B-95CE-6DB70DBA9567}" type="datetimeFigureOut">
               <a:rPr lang="en-US" dirty="0"/>
               <a:pPr/>
-              <a:t>1/4/2021</a:t>
+              <a:t>1/8/2021</a:t>
             </a:fld>
             <a:endParaRPr lang="en-US" dirty="0"/>
           </a:p>
@@ -5720,17 +5725,23 @@
           <a:lstStyle/>
           <a:p>
             <a:r>
+              <a:rPr lang="en-US" b="1" dirty="0"/>
+              <a:t>Dan Killian and Ted Papalexopoulos</a:t>
+            </a:r>
+          </a:p>
+          <a:p>
+            <a:endParaRPr lang="en-US" dirty="0"/>
+          </a:p>
+          <a:p>
+            <a:r>
               <a:rPr lang="en-US" dirty="0"/>
-              <a:t>Dan Killian and Ted Papalexopoulos</a:t>
-            </a:r>
-          </a:p>
-          <a:p>
-            <a:endParaRPr lang="en-US" dirty="0"/>
-          </a:p>
-          <a:p>
-            <a:r>
-              <a:rPr lang="en-US" b="1" dirty="0"/>
-              <a:t>COS 2021</a:t>
+              <a:t>15.S60 COS 2021</a:t>
+            </a:r>
+          </a:p>
+          <a:p>
+            <a:r>
+              <a:rPr lang="en-US" dirty="0"/>
+              <a:t>12 January 2021</a:t>
             </a:r>
           </a:p>
         </p:txBody>
@@ -5870,8 +5881,20 @@
           </a:p>
           <a:p>
             <a:r>
+              <a:rPr lang="en-US" dirty="0">
+                <a:hlinkClick r:id="rId2"/>
+              </a:rPr>
+              <a:t>https://r4ds.had.co.nz/index.html</a:t>
+            </a:r>
+            <a:endParaRPr lang="en-US" dirty="0"/>
+          </a:p>
+          <a:p>
+            <a:endParaRPr lang="en-US" dirty="0"/>
+          </a:p>
+          <a:p>
+            <a:r>
               <a:rPr lang="en-US" dirty="0"/>
-              <a:t>https://r4ds.had.co.nz/index.html</a:t>
+              <a:t>Also need to give a shout-out to the student instructors who previously taught this session.</a:t>
             </a:r>
           </a:p>
         </p:txBody>
@@ -6074,7 +6097,7 @@
         </p:nvSpPr>
         <p:spPr>
           <a:xfrm>
-            <a:off x="1001947" y="5107024"/>
+            <a:off x="981627" y="4736077"/>
             <a:ext cx="1326204" cy="715089"/>
           </a:xfrm>
           <a:prstGeom prst="flowChartAlternateProcess">
@@ -6114,7 +6137,7 @@
         </p:nvSpPr>
         <p:spPr>
           <a:xfrm>
-            <a:off x="2976663" y="5123237"/>
+            <a:off x="2956343" y="4736077"/>
             <a:ext cx="1326204" cy="715089"/>
           </a:xfrm>
           <a:prstGeom prst="flowChartAlternateProcess">
@@ -6154,7 +6177,7 @@
         </p:nvSpPr>
         <p:spPr>
           <a:xfrm>
-            <a:off x="9865214" y="2611119"/>
+            <a:off x="9357214" y="2644985"/>
             <a:ext cx="1326204" cy="715089"/>
           </a:xfrm>
           <a:prstGeom prst="flowChartAlternateProcess">
@@ -6194,7 +6217,7 @@
         </p:nvSpPr>
         <p:spPr>
           <a:xfrm>
-            <a:off x="4964347" y="5119997"/>
+            <a:off x="4944027" y="4736077"/>
             <a:ext cx="1857985" cy="715089"/>
           </a:xfrm>
           <a:prstGeom prst="flowChartAlternateProcess">
@@ -6234,8 +6257,8 @@
         </p:nvSpPr>
         <p:spPr>
           <a:xfrm>
-            <a:off x="7431931" y="5136208"/>
-            <a:ext cx="1712069" cy="715089"/>
+            <a:off x="7219649" y="4736077"/>
+            <a:ext cx="2635551" cy="715089"/>
           </a:xfrm>
           <a:prstGeom prst="flowChartAlternateProcess">
             <a:avLst/>
@@ -6255,7 +6278,7 @@
           <a:p>
             <a:r>
               <a:rPr lang="en-US" dirty="0"/>
-              <a:t>Build models to predict.</a:t>
+              <a:t>Build models to predict and optimize.</a:t>
             </a:r>
           </a:p>
         </p:txBody>
@@ -6380,14 +6403,14 @@
           <p:nvPr/>
         </p:nvSpPr>
         <p:spPr>
-          <a:xfrm rot="18892594" flipH="1">
-            <a:off x="1630341" y="3784218"/>
-            <a:ext cx="3277174" cy="960571"/>
+          <a:xfrm rot="19630192" flipH="1">
+            <a:off x="1869906" y="3468729"/>
+            <a:ext cx="3030323" cy="1069367"/>
           </a:xfrm>
           <a:prstGeom prst="arc">
             <a:avLst>
-              <a:gd name="adj1" fmla="val 12704880"/>
-              <a:gd name="adj2" fmla="val 20914512"/>
+              <a:gd name="adj1" fmla="val 13937793"/>
+              <a:gd name="adj2" fmla="val 21269206"/>
             </a:avLst>
           </a:prstGeom>
           <a:noFill/>
@@ -6438,13 +6461,13 @@
         </p:nvSpPr>
         <p:spPr>
           <a:xfrm rot="18892594" flipH="1">
-            <a:off x="3170938" y="3623664"/>
-            <a:ext cx="3005075" cy="762144"/>
+            <a:off x="3453556" y="3532308"/>
+            <a:ext cx="2333859" cy="1250263"/>
           </a:xfrm>
           <a:prstGeom prst="arc">
             <a:avLst>
               <a:gd name="adj1" fmla="val 13721617"/>
-              <a:gd name="adj2" fmla="val 21429410"/>
+              <a:gd name="adj2" fmla="val 20705273"/>
             </a:avLst>
           </a:prstGeom>
           <a:noFill/>
@@ -6495,13 +6518,13 @@
         </p:nvSpPr>
         <p:spPr>
           <a:xfrm rot="17423602" flipH="1" flipV="1">
-            <a:off x="4575812" y="3030480"/>
-            <a:ext cx="3083027" cy="1933934"/>
+            <a:off x="5116861" y="3032036"/>
+            <a:ext cx="2426738" cy="1447466"/>
           </a:xfrm>
           <a:prstGeom prst="arc">
             <a:avLst>
-              <a:gd name="adj1" fmla="val 11287462"/>
-              <a:gd name="adj2" fmla="val 18968309"/>
+              <a:gd name="adj1" fmla="val 11183158"/>
+              <a:gd name="adj2" fmla="val 19449499"/>
             </a:avLst>
           </a:prstGeom>
           <a:noFill/>
@@ -6552,13 +6575,13 @@
         </p:nvSpPr>
         <p:spPr>
           <a:xfrm rot="16617764" flipH="1" flipV="1">
-            <a:off x="5441701" y="2828505"/>
-            <a:ext cx="1933199" cy="3900972"/>
+            <a:off x="5856686" y="2461115"/>
+            <a:ext cx="1192960" cy="3900972"/>
           </a:xfrm>
           <a:prstGeom prst="arc">
             <a:avLst>
               <a:gd name="adj1" fmla="val 11287462"/>
-              <a:gd name="adj2" fmla="val 16195109"/>
+              <a:gd name="adj2" fmla="val 16271051"/>
             </a:avLst>
           </a:prstGeom>
           <a:noFill/>
@@ -6609,13 +6632,13 @@
         </p:nvSpPr>
         <p:spPr>
           <a:xfrm rot="19875378">
-            <a:off x="8218746" y="2694428"/>
-            <a:ext cx="1660896" cy="804411"/>
+            <a:off x="8265311" y="2477705"/>
+            <a:ext cx="1344206" cy="1309924"/>
           </a:xfrm>
           <a:prstGeom prst="arc">
             <a:avLst>
               <a:gd name="adj1" fmla="val 12586546"/>
-              <a:gd name="adj2" fmla="val 21448179"/>
+              <a:gd name="adj2" fmla="val 20152335"/>
             </a:avLst>
           </a:prstGeom>
           <a:noFill/>
@@ -6666,7 +6689,7 @@
         </p:nvSpPr>
         <p:spPr>
           <a:xfrm>
-            <a:off x="1114426" y="5920087"/>
+            <a:off x="1100879" y="5520460"/>
             <a:ext cx="1278731" cy="707886"/>
           </a:xfrm>
           <a:prstGeom prst="rect">
@@ -6739,7 +6762,7 @@
         </p:nvSpPr>
         <p:spPr>
           <a:xfrm>
-            <a:off x="5088731" y="5920087"/>
+            <a:off x="5075184" y="5520460"/>
             <a:ext cx="1862137" cy="400110"/>
           </a:xfrm>
           <a:prstGeom prst="rect">
@@ -6790,7 +6813,7 @@
         </p:nvSpPr>
         <p:spPr>
           <a:xfrm>
-            <a:off x="7584282" y="5920087"/>
+            <a:off x="7570735" y="5520460"/>
             <a:ext cx="1862137" cy="707886"/>
           </a:xfrm>
           <a:prstGeom prst="rect">
@@ -6863,7 +6886,7 @@
         </p:nvSpPr>
         <p:spPr>
           <a:xfrm>
-            <a:off x="3017044" y="5920087"/>
+            <a:off x="3003497" y="5520460"/>
             <a:ext cx="1278731" cy="400110"/>
           </a:xfrm>
           <a:prstGeom prst="rect">
@@ -6900,6 +6923,79 @@
           </a:p>
         </p:txBody>
       </p:sp>
+      <p:sp>
+        <p:nvSpPr>
+          <p:cNvPr id="24" name="Rectangle 23">
+            <a:extLst>
+              <a:ext uri="{FF2B5EF4-FFF2-40B4-BE49-F238E27FC236}">
+                <a16:creationId xmlns:a16="http://schemas.microsoft.com/office/drawing/2014/main" id="{683603FC-9AF8-4A05-BB8E-7FC7547E0582}"/>
+              </a:ext>
+            </a:extLst>
+          </p:cNvPr>
+          <p:cNvSpPr/>
+          <p:nvPr/>
+        </p:nvSpPr>
+        <p:spPr>
+          <a:xfrm>
+            <a:off x="9254196" y="3450919"/>
+            <a:ext cx="1862137" cy="1015663"/>
+          </a:xfrm>
+          <a:prstGeom prst="rect">
+            <a:avLst/>
+          </a:prstGeom>
+          <a:noFill/>
+        </p:spPr>
+        <p:txBody>
+          <a:bodyPr wrap="square" lIns="91440" tIns="45720" rIns="91440" bIns="45720">
+            <a:spAutoFit/>
+          </a:bodyPr>
+          <a:lstStyle/>
+          <a:p>
+            <a:pPr marL="182880" indent="-182880">
+              <a:buFont typeface="Arial" panose="020B0604020202020204" pitchFamily="34" charset="0"/>
+              <a:buChar char="•"/>
+            </a:pPr>
+            <a:r>
+              <a:rPr lang="en-US" sz="2000" dirty="0">
+                <a:ln w="0"/>
+                <a:solidFill>
+                  <a:srgbClr val="00B0F0"/>
+                </a:solidFill>
+                <a:effectLst>
+                  <a:outerShdw blurRad="38100" dist="25400" dir="5400000" algn="ctr" rotWithShape="0">
+                    <a:srgbClr val="6E747A">
+                      <a:alpha val="43000"/>
+                    </a:srgbClr>
+                  </a:outerShdw>
+                </a:effectLst>
+              </a:rPr>
+              <a:t>Personal Webpage</a:t>
+            </a:r>
+          </a:p>
+          <a:p>
+            <a:pPr marL="182880" indent="-182880">
+              <a:buFont typeface="Arial" panose="020B0604020202020204" pitchFamily="34" charset="0"/>
+              <a:buChar char="•"/>
+            </a:pPr>
+            <a:r>
+              <a:rPr lang="en-US" sz="2000" dirty="0">
+                <a:ln w="0"/>
+                <a:solidFill>
+                  <a:srgbClr val="00B0F0"/>
+                </a:solidFill>
+                <a:effectLst>
+                  <a:outerShdw blurRad="38100" dist="25400" dir="5400000" algn="ctr" rotWithShape="0">
+                    <a:srgbClr val="6E747A">
+                      <a:alpha val="43000"/>
+                    </a:srgbClr>
+                  </a:outerShdw>
+                </a:effectLst>
+              </a:rPr>
+              <a:t>Shiny (R)</a:t>
+            </a:r>
+          </a:p>
+        </p:txBody>
+      </p:sp>
     </p:spTree>
     <p:extLst>
       <p:ext uri="{BB962C8B-B14F-4D97-AF65-F5344CB8AC3E}">
@@ -6910,6 +7006,713 @@
   <p:clrMapOvr>
     <a:masterClrMapping/>
   </p:clrMapOvr>
+  <p:timing>
+    <p:tnLst>
+      <p:par>
+        <p:cTn id="1" dur="indefinite" restart="never" nodeType="tmRoot">
+          <p:childTnLst>
+            <p:seq concurrent="1" nextAc="seek">
+              <p:cTn id="2" dur="indefinite" nodeType="mainSeq">
+                <p:childTnLst>
+                  <p:par>
+                    <p:cTn id="3" fill="hold">
+                      <p:stCondLst>
+                        <p:cond delay="indefinite"/>
+                      </p:stCondLst>
+                      <p:childTnLst>
+                        <p:par>
+                          <p:cTn id="4" fill="hold">
+                            <p:stCondLst>
+                              <p:cond delay="0"/>
+                            </p:stCondLst>
+                            <p:childTnLst>
+                              <p:par>
+                                <p:cTn id="5" presetID="1" presetClass="entr" presetSubtype="0" fill="hold" grpId="0" nodeType="clickEffect">
+                                  <p:stCondLst>
+                                    <p:cond delay="0"/>
+                                  </p:stCondLst>
+                                  <p:childTnLst>
+                                    <p:set>
+                                      <p:cBhvr>
+                                        <p:cTn id="6" dur="1" fill="hold">
+                                          <p:stCondLst>
+                                            <p:cond delay="0"/>
+                                          </p:stCondLst>
+                                        </p:cTn>
+                                        <p:tgtEl>
+                                          <p:spTgt spid="13"/>
+                                        </p:tgtEl>
+                                        <p:attrNameLst>
+                                          <p:attrName>style.visibility</p:attrName>
+                                        </p:attrNameLst>
+                                      </p:cBhvr>
+                                      <p:to>
+                                        <p:strVal val="visible"/>
+                                      </p:to>
+                                    </p:set>
+                                  </p:childTnLst>
+                                </p:cTn>
+                              </p:par>
+                              <p:par>
+                                <p:cTn id="7" presetID="1" presetClass="entr" presetSubtype="0" fill="hold" nodeType="withEffect">
+                                  <p:stCondLst>
+                                    <p:cond delay="0"/>
+                                  </p:stCondLst>
+                                  <p:childTnLst>
+                                    <p:set>
+                                      <p:cBhvr>
+                                        <p:cTn id="8" dur="1" fill="hold">
+                                          <p:stCondLst>
+                                            <p:cond delay="0"/>
+                                          </p:stCondLst>
+                                        </p:cTn>
+                                        <p:tgtEl>
+                                          <p:spTgt spid="5"/>
+                                        </p:tgtEl>
+                                        <p:attrNameLst>
+                                          <p:attrName>style.visibility</p:attrName>
+                                        </p:attrNameLst>
+                                      </p:cBhvr>
+                                      <p:to>
+                                        <p:strVal val="visible"/>
+                                      </p:to>
+                                    </p:set>
+                                  </p:childTnLst>
+                                </p:cTn>
+                              </p:par>
+                            </p:childTnLst>
+                          </p:cTn>
+                        </p:par>
+                      </p:childTnLst>
+                    </p:cTn>
+                  </p:par>
+                  <p:par>
+                    <p:cTn id="9" fill="hold">
+                      <p:stCondLst>
+                        <p:cond delay="indefinite"/>
+                      </p:stCondLst>
+                      <p:childTnLst>
+                        <p:par>
+                          <p:cTn id="10" fill="hold">
+                            <p:stCondLst>
+                              <p:cond delay="0"/>
+                            </p:stCondLst>
+                            <p:childTnLst>
+                              <p:par>
+                                <p:cTn id="11" presetID="1" presetClass="entr" presetSubtype="0" fill="hold" grpId="0" nodeType="clickEffect">
+                                  <p:stCondLst>
+                                    <p:cond delay="0"/>
+                                  </p:stCondLst>
+                                  <p:childTnLst>
+                                    <p:set>
+                                      <p:cBhvr>
+                                        <p:cTn id="12" dur="1" fill="hold">
+                                          <p:stCondLst>
+                                            <p:cond delay="0"/>
+                                          </p:stCondLst>
+                                        </p:cTn>
+                                        <p:tgtEl>
+                                          <p:spTgt spid="14"/>
+                                        </p:tgtEl>
+                                        <p:attrNameLst>
+                                          <p:attrName>style.visibility</p:attrName>
+                                        </p:attrNameLst>
+                                      </p:cBhvr>
+                                      <p:to>
+                                        <p:strVal val="visible"/>
+                                      </p:to>
+                                    </p:set>
+                                  </p:childTnLst>
+                                </p:cTn>
+                              </p:par>
+                              <p:par>
+                                <p:cTn id="13" presetID="1" presetClass="entr" presetSubtype="0" fill="hold" grpId="0" nodeType="withEffect">
+                                  <p:stCondLst>
+                                    <p:cond delay="0"/>
+                                  </p:stCondLst>
+                                  <p:childTnLst>
+                                    <p:set>
+                                      <p:cBhvr>
+                                        <p:cTn id="14" dur="1" fill="hold">
+                                          <p:stCondLst>
+                                            <p:cond delay="0"/>
+                                          </p:stCondLst>
+                                        </p:cTn>
+                                        <p:tgtEl>
+                                          <p:spTgt spid="7"/>
+                                        </p:tgtEl>
+                                        <p:attrNameLst>
+                                          <p:attrName>style.visibility</p:attrName>
+                                        </p:attrNameLst>
+                                      </p:cBhvr>
+                                      <p:to>
+                                        <p:strVal val="visible"/>
+                                      </p:to>
+                                    </p:set>
+                                  </p:childTnLst>
+                                </p:cTn>
+                              </p:par>
+                            </p:childTnLst>
+                          </p:cTn>
+                        </p:par>
+                      </p:childTnLst>
+                    </p:cTn>
+                  </p:par>
+                  <p:par>
+                    <p:cTn id="15" fill="hold">
+                      <p:stCondLst>
+                        <p:cond delay="indefinite"/>
+                      </p:stCondLst>
+                      <p:childTnLst>
+                        <p:par>
+                          <p:cTn id="16" fill="hold">
+                            <p:stCondLst>
+                              <p:cond delay="0"/>
+                            </p:stCondLst>
+                            <p:childTnLst>
+                              <p:par>
+                                <p:cTn id="17" presetID="1" presetClass="entr" presetSubtype="0" fill="hold" grpId="0" nodeType="clickEffect">
+                                  <p:stCondLst>
+                                    <p:cond delay="0"/>
+                                  </p:stCondLst>
+                                  <p:childTnLst>
+                                    <p:set>
+                                      <p:cBhvr>
+                                        <p:cTn id="18" dur="1" fill="hold">
+                                          <p:stCondLst>
+                                            <p:cond delay="0"/>
+                                          </p:stCondLst>
+                                        </p:cTn>
+                                        <p:tgtEl>
+                                          <p:spTgt spid="15"/>
+                                        </p:tgtEl>
+                                        <p:attrNameLst>
+                                          <p:attrName>style.visibility</p:attrName>
+                                        </p:attrNameLst>
+                                      </p:cBhvr>
+                                      <p:to>
+                                        <p:strVal val="visible"/>
+                                      </p:to>
+                                    </p:set>
+                                  </p:childTnLst>
+                                </p:cTn>
+                              </p:par>
+                              <p:par>
+                                <p:cTn id="19" presetID="1" presetClass="entr" presetSubtype="0" fill="hold" grpId="0" nodeType="withEffect">
+                                  <p:stCondLst>
+                                    <p:cond delay="0"/>
+                                  </p:stCondLst>
+                                  <p:childTnLst>
+                                    <p:set>
+                                      <p:cBhvr>
+                                        <p:cTn id="20" dur="1" fill="hold">
+                                          <p:stCondLst>
+                                            <p:cond delay="0"/>
+                                          </p:stCondLst>
+                                        </p:cTn>
+                                        <p:tgtEl>
+                                          <p:spTgt spid="8"/>
+                                        </p:tgtEl>
+                                        <p:attrNameLst>
+                                          <p:attrName>style.visibility</p:attrName>
+                                        </p:attrNameLst>
+                                      </p:cBhvr>
+                                      <p:to>
+                                        <p:strVal val="visible"/>
+                                      </p:to>
+                                    </p:set>
+                                  </p:childTnLst>
+                                </p:cTn>
+                              </p:par>
+                            </p:childTnLst>
+                          </p:cTn>
+                        </p:par>
+                      </p:childTnLst>
+                    </p:cTn>
+                  </p:par>
+                  <p:par>
+                    <p:cTn id="21" fill="hold">
+                      <p:stCondLst>
+                        <p:cond delay="indefinite"/>
+                      </p:stCondLst>
+                      <p:childTnLst>
+                        <p:par>
+                          <p:cTn id="22" fill="hold">
+                            <p:stCondLst>
+                              <p:cond delay="0"/>
+                            </p:stCondLst>
+                            <p:childTnLst>
+                              <p:par>
+                                <p:cTn id="23" presetID="1" presetClass="entr" presetSubtype="0" fill="hold" grpId="0" nodeType="clickEffect">
+                                  <p:stCondLst>
+                                    <p:cond delay="0"/>
+                                  </p:stCondLst>
+                                  <p:childTnLst>
+                                    <p:set>
+                                      <p:cBhvr>
+                                        <p:cTn id="24" dur="1" fill="hold">
+                                          <p:stCondLst>
+                                            <p:cond delay="0"/>
+                                          </p:stCondLst>
+                                        </p:cTn>
+                                        <p:tgtEl>
+                                          <p:spTgt spid="16"/>
+                                        </p:tgtEl>
+                                        <p:attrNameLst>
+                                          <p:attrName>style.visibility</p:attrName>
+                                        </p:attrNameLst>
+                                      </p:cBhvr>
+                                      <p:to>
+                                        <p:strVal val="visible"/>
+                                      </p:to>
+                                    </p:set>
+                                  </p:childTnLst>
+                                </p:cTn>
+                              </p:par>
+                              <p:par>
+                                <p:cTn id="25" presetID="1" presetClass="entr" presetSubtype="0" fill="hold" grpId="0" nodeType="withEffect">
+                                  <p:stCondLst>
+                                    <p:cond delay="0"/>
+                                  </p:stCondLst>
+                                  <p:childTnLst>
+                                    <p:set>
+                                      <p:cBhvr>
+                                        <p:cTn id="26" dur="1" fill="hold">
+                                          <p:stCondLst>
+                                            <p:cond delay="0"/>
+                                          </p:stCondLst>
+                                        </p:cTn>
+                                        <p:tgtEl>
+                                          <p:spTgt spid="9"/>
+                                        </p:tgtEl>
+                                        <p:attrNameLst>
+                                          <p:attrName>style.visibility</p:attrName>
+                                        </p:attrNameLst>
+                                      </p:cBhvr>
+                                      <p:to>
+                                        <p:strVal val="visible"/>
+                                      </p:to>
+                                    </p:set>
+                                  </p:childTnLst>
+                                </p:cTn>
+                              </p:par>
+                            </p:childTnLst>
+                          </p:cTn>
+                        </p:par>
+                      </p:childTnLst>
+                    </p:cTn>
+                  </p:par>
+                  <p:par>
+                    <p:cTn id="27" fill="hold">
+                      <p:stCondLst>
+                        <p:cond delay="indefinite"/>
+                      </p:stCondLst>
+                      <p:childTnLst>
+                        <p:par>
+                          <p:cTn id="28" fill="hold">
+                            <p:stCondLst>
+                              <p:cond delay="0"/>
+                            </p:stCondLst>
+                            <p:childTnLst>
+                              <p:par>
+                                <p:cTn id="29" presetID="1" presetClass="entr" presetSubtype="0" fill="hold" grpId="0" nodeType="clickEffect">
+                                  <p:stCondLst>
+                                    <p:cond delay="0"/>
+                                  </p:stCondLst>
+                                  <p:childTnLst>
+                                    <p:set>
+                                      <p:cBhvr>
+                                        <p:cTn id="30" dur="1" fill="hold">
+                                          <p:stCondLst>
+                                            <p:cond delay="0"/>
+                                          </p:stCondLst>
+                                        </p:cTn>
+                                        <p:tgtEl>
+                                          <p:spTgt spid="17"/>
+                                        </p:tgtEl>
+                                        <p:attrNameLst>
+                                          <p:attrName>style.visibility</p:attrName>
+                                        </p:attrNameLst>
+                                      </p:cBhvr>
+                                      <p:to>
+                                        <p:strVal val="visible"/>
+                                      </p:to>
+                                    </p:set>
+                                  </p:childTnLst>
+                                </p:cTn>
+                              </p:par>
+                              <p:par>
+                                <p:cTn id="31" presetID="1" presetClass="entr" presetSubtype="0" fill="hold" grpId="0" nodeType="withEffect">
+                                  <p:stCondLst>
+                                    <p:cond delay="0"/>
+                                  </p:stCondLst>
+                                  <p:childTnLst>
+                                    <p:set>
+                                      <p:cBhvr>
+                                        <p:cTn id="32" dur="1" fill="hold">
+                                          <p:stCondLst>
+                                            <p:cond delay="0"/>
+                                          </p:stCondLst>
+                                        </p:cTn>
+                                        <p:tgtEl>
+                                          <p:spTgt spid="11"/>
+                                        </p:tgtEl>
+                                        <p:attrNameLst>
+                                          <p:attrName>style.visibility</p:attrName>
+                                        </p:attrNameLst>
+                                      </p:cBhvr>
+                                      <p:to>
+                                        <p:strVal val="visible"/>
+                                      </p:to>
+                                    </p:set>
+                                  </p:childTnLst>
+                                </p:cTn>
+                              </p:par>
+                            </p:childTnLst>
+                          </p:cTn>
+                        </p:par>
+                      </p:childTnLst>
+                    </p:cTn>
+                  </p:par>
+                  <p:par>
+                    <p:cTn id="33" fill="hold">
+                      <p:stCondLst>
+                        <p:cond delay="indefinite"/>
+                      </p:stCondLst>
+                      <p:childTnLst>
+                        <p:par>
+                          <p:cTn id="34" fill="hold">
+                            <p:stCondLst>
+                              <p:cond delay="0"/>
+                            </p:stCondLst>
+                            <p:childTnLst>
+                              <p:par>
+                                <p:cTn id="35" presetID="1" presetClass="entr" presetSubtype="0" fill="hold" grpId="0" nodeType="clickEffect">
+                                  <p:stCondLst>
+                                    <p:cond delay="0"/>
+                                  </p:stCondLst>
+                                  <p:childTnLst>
+                                    <p:set>
+                                      <p:cBhvr>
+                                        <p:cTn id="36" dur="1" fill="hold">
+                                          <p:stCondLst>
+                                            <p:cond delay="0"/>
+                                          </p:stCondLst>
+                                        </p:cTn>
+                                        <p:tgtEl>
+                                          <p:spTgt spid="18"/>
+                                        </p:tgtEl>
+                                        <p:attrNameLst>
+                                          <p:attrName>style.visibility</p:attrName>
+                                        </p:attrNameLst>
+                                      </p:cBhvr>
+                                      <p:to>
+                                        <p:strVal val="visible"/>
+                                      </p:to>
+                                    </p:set>
+                                  </p:childTnLst>
+                                </p:cTn>
+                              </p:par>
+                              <p:par>
+                                <p:cTn id="37" presetID="1" presetClass="entr" presetSubtype="0" fill="hold" grpId="0" nodeType="withEffect">
+                                  <p:stCondLst>
+                                    <p:cond delay="0"/>
+                                  </p:stCondLst>
+                                  <p:childTnLst>
+                                    <p:set>
+                                      <p:cBhvr>
+                                        <p:cTn id="38" dur="1" fill="hold">
+                                          <p:stCondLst>
+                                            <p:cond delay="0"/>
+                                          </p:stCondLst>
+                                        </p:cTn>
+                                        <p:tgtEl>
+                                          <p:spTgt spid="12"/>
+                                        </p:tgtEl>
+                                        <p:attrNameLst>
+                                          <p:attrName>style.visibility</p:attrName>
+                                        </p:attrNameLst>
+                                      </p:cBhvr>
+                                      <p:to>
+                                        <p:strVal val="visible"/>
+                                      </p:to>
+                                    </p:set>
+                                  </p:childTnLst>
+                                </p:cTn>
+                              </p:par>
+                            </p:childTnLst>
+                          </p:cTn>
+                        </p:par>
+                      </p:childTnLst>
+                    </p:cTn>
+                  </p:par>
+                  <p:par>
+                    <p:cTn id="39" fill="hold">
+                      <p:stCondLst>
+                        <p:cond delay="indefinite"/>
+                      </p:stCondLst>
+                      <p:childTnLst>
+                        <p:par>
+                          <p:cTn id="40" fill="hold">
+                            <p:stCondLst>
+                              <p:cond delay="0"/>
+                            </p:stCondLst>
+                            <p:childTnLst>
+                              <p:par>
+                                <p:cTn id="41" presetID="1" presetClass="entr" presetSubtype="0" fill="hold" grpId="0" nodeType="clickEffect">
+                                  <p:stCondLst>
+                                    <p:cond delay="0"/>
+                                  </p:stCondLst>
+                                  <p:childTnLst>
+                                    <p:set>
+                                      <p:cBhvr>
+                                        <p:cTn id="42" dur="1" fill="hold">
+                                          <p:stCondLst>
+                                            <p:cond delay="0"/>
+                                          </p:stCondLst>
+                                        </p:cTn>
+                                        <p:tgtEl>
+                                          <p:spTgt spid="19"/>
+                                        </p:tgtEl>
+                                        <p:attrNameLst>
+                                          <p:attrName>style.visibility</p:attrName>
+                                        </p:attrNameLst>
+                                      </p:cBhvr>
+                                      <p:to>
+                                        <p:strVal val="visible"/>
+                                      </p:to>
+                                    </p:set>
+                                  </p:childTnLst>
+                                </p:cTn>
+                              </p:par>
+                              <p:par>
+                                <p:cTn id="43" presetID="1" presetClass="entr" presetSubtype="0" fill="hold" grpId="0" nodeType="withEffect">
+                                  <p:stCondLst>
+                                    <p:cond delay="0"/>
+                                  </p:stCondLst>
+                                  <p:childTnLst>
+                                    <p:set>
+                                      <p:cBhvr>
+                                        <p:cTn id="44" dur="1" fill="hold">
+                                          <p:stCondLst>
+                                            <p:cond delay="0"/>
+                                          </p:stCondLst>
+                                        </p:cTn>
+                                        <p:tgtEl>
+                                          <p:spTgt spid="10"/>
+                                        </p:tgtEl>
+                                        <p:attrNameLst>
+                                          <p:attrName>style.visibility</p:attrName>
+                                        </p:attrNameLst>
+                                      </p:cBhvr>
+                                      <p:to>
+                                        <p:strVal val="visible"/>
+                                      </p:to>
+                                    </p:set>
+                                  </p:childTnLst>
+                                </p:cTn>
+                              </p:par>
+                            </p:childTnLst>
+                          </p:cTn>
+                        </p:par>
+                      </p:childTnLst>
+                    </p:cTn>
+                  </p:par>
+                  <p:par>
+                    <p:cTn id="45" fill="hold">
+                      <p:stCondLst>
+                        <p:cond delay="indefinite"/>
+                      </p:stCondLst>
+                      <p:childTnLst>
+                        <p:par>
+                          <p:cTn id="46" fill="hold">
+                            <p:stCondLst>
+                              <p:cond delay="0"/>
+                            </p:stCondLst>
+                            <p:childTnLst>
+                              <p:par>
+                                <p:cTn id="47" presetID="1" presetClass="entr" presetSubtype="0" fill="hold" grpId="0" nodeType="clickEffect">
+                                  <p:stCondLst>
+                                    <p:cond delay="0"/>
+                                  </p:stCondLst>
+                                  <p:childTnLst>
+                                    <p:set>
+                                      <p:cBhvr>
+                                        <p:cTn id="48" dur="1" fill="hold">
+                                          <p:stCondLst>
+                                            <p:cond delay="0"/>
+                                          </p:stCondLst>
+                                        </p:cTn>
+                                        <p:tgtEl>
+                                          <p:spTgt spid="20"/>
+                                        </p:tgtEl>
+                                        <p:attrNameLst>
+                                          <p:attrName>style.visibility</p:attrName>
+                                        </p:attrNameLst>
+                                      </p:cBhvr>
+                                      <p:to>
+                                        <p:strVal val="visible"/>
+                                      </p:to>
+                                    </p:set>
+                                  </p:childTnLst>
+                                </p:cTn>
+                              </p:par>
+                              <p:par>
+                                <p:cTn id="49" presetID="1" presetClass="entr" presetSubtype="0" fill="hold" grpId="0" nodeType="withEffect">
+                                  <p:stCondLst>
+                                    <p:cond delay="0"/>
+                                  </p:stCondLst>
+                                  <p:childTnLst>
+                                    <p:set>
+                                      <p:cBhvr>
+                                        <p:cTn id="50" dur="1" fill="hold">
+                                          <p:stCondLst>
+                                            <p:cond delay="0"/>
+                                          </p:stCondLst>
+                                        </p:cTn>
+                                        <p:tgtEl>
+                                          <p:spTgt spid="23"/>
+                                        </p:tgtEl>
+                                        <p:attrNameLst>
+                                          <p:attrName>style.visibility</p:attrName>
+                                        </p:attrNameLst>
+                                      </p:cBhvr>
+                                      <p:to>
+                                        <p:strVal val="visible"/>
+                                      </p:to>
+                                    </p:set>
+                                  </p:childTnLst>
+                                </p:cTn>
+                              </p:par>
+                              <p:par>
+                                <p:cTn id="51" presetID="1" presetClass="entr" presetSubtype="0" fill="hold" grpId="0" nodeType="withEffect">
+                                  <p:stCondLst>
+                                    <p:cond delay="0"/>
+                                  </p:stCondLst>
+                                  <p:childTnLst>
+                                    <p:set>
+                                      <p:cBhvr>
+                                        <p:cTn id="52" dur="1" fill="hold">
+                                          <p:stCondLst>
+                                            <p:cond delay="0"/>
+                                          </p:stCondLst>
+                                        </p:cTn>
+                                        <p:tgtEl>
+                                          <p:spTgt spid="21"/>
+                                        </p:tgtEl>
+                                        <p:attrNameLst>
+                                          <p:attrName>style.visibility</p:attrName>
+                                        </p:attrNameLst>
+                                      </p:cBhvr>
+                                      <p:to>
+                                        <p:strVal val="visible"/>
+                                      </p:to>
+                                    </p:set>
+                                  </p:childTnLst>
+                                </p:cTn>
+                              </p:par>
+                              <p:par>
+                                <p:cTn id="53" presetID="1" presetClass="entr" presetSubtype="0" fill="hold" grpId="0" nodeType="withEffect">
+                                  <p:stCondLst>
+                                    <p:cond delay="0"/>
+                                  </p:stCondLst>
+                                  <p:childTnLst>
+                                    <p:set>
+                                      <p:cBhvr>
+                                        <p:cTn id="54" dur="1" fill="hold">
+                                          <p:stCondLst>
+                                            <p:cond delay="0"/>
+                                          </p:stCondLst>
+                                        </p:cTn>
+                                        <p:tgtEl>
+                                          <p:spTgt spid="22"/>
+                                        </p:tgtEl>
+                                        <p:attrNameLst>
+                                          <p:attrName>style.visibility</p:attrName>
+                                        </p:attrNameLst>
+                                      </p:cBhvr>
+                                      <p:to>
+                                        <p:strVal val="visible"/>
+                                      </p:to>
+                                    </p:set>
+                                  </p:childTnLst>
+                                </p:cTn>
+                              </p:par>
+                              <p:par>
+                                <p:cTn id="55" presetID="1" presetClass="entr" presetSubtype="0" fill="hold" grpId="0" nodeType="withEffect">
+                                  <p:stCondLst>
+                                    <p:cond delay="0"/>
+                                  </p:stCondLst>
+                                  <p:childTnLst>
+                                    <p:set>
+                                      <p:cBhvr>
+                                        <p:cTn id="56" dur="1" fill="hold">
+                                          <p:stCondLst>
+                                            <p:cond delay="0"/>
+                                          </p:stCondLst>
+                                        </p:cTn>
+                                        <p:tgtEl>
+                                          <p:spTgt spid="24"/>
+                                        </p:tgtEl>
+                                        <p:attrNameLst>
+                                          <p:attrName>style.visibility</p:attrName>
+                                        </p:attrNameLst>
+                                      </p:cBhvr>
+                                      <p:to>
+                                        <p:strVal val="visible"/>
+                                      </p:to>
+                                    </p:set>
+                                  </p:childTnLst>
+                                </p:cTn>
+                              </p:par>
+                            </p:childTnLst>
+                          </p:cTn>
+                        </p:par>
+                      </p:childTnLst>
+                    </p:cTn>
+                  </p:par>
+                </p:childTnLst>
+              </p:cTn>
+              <p:prevCondLst>
+                <p:cond evt="onPrev" delay="0">
+                  <p:tgtEl>
+                    <p:sldTgt/>
+                  </p:tgtEl>
+                </p:cond>
+              </p:prevCondLst>
+              <p:nextCondLst>
+                <p:cond evt="onNext" delay="0">
+                  <p:tgtEl>
+                    <p:sldTgt/>
+                  </p:tgtEl>
+                </p:cond>
+              </p:nextCondLst>
+            </p:seq>
+          </p:childTnLst>
+        </p:cTn>
+      </p:par>
+    </p:tnLst>
+    <p:bldLst>
+      <p:bldP spid="7" grpId="0" animBg="1"/>
+      <p:bldP spid="8" grpId="0" animBg="1"/>
+      <p:bldP spid="9" grpId="0" animBg="1"/>
+      <p:bldP spid="10" grpId="0" animBg="1"/>
+      <p:bldP spid="11" grpId="0" animBg="1"/>
+      <p:bldP spid="12" grpId="0" animBg="1"/>
+      <p:bldP spid="13" grpId="0"/>
+      <p:bldP spid="14" grpId="0" animBg="1"/>
+      <p:bldP spid="15" grpId="0" animBg="1"/>
+      <p:bldP spid="16" grpId="0" animBg="1"/>
+      <p:bldP spid="17" grpId="0" animBg="1"/>
+      <p:bldP spid="18" grpId="0" animBg="1"/>
+      <p:bldP spid="19" grpId="0" animBg="1"/>
+      <p:bldP spid="20" grpId="0"/>
+      <p:bldP spid="21" grpId="0"/>
+      <p:bldP spid="22" grpId="0"/>
+      <p:bldP spid="23" grpId="0"/>
+      <p:bldP spid="24" grpId="0"/>
+    </p:bldLst>
+  </p:timing>
 </p:sld>
 </file>
 
@@ -7021,760 +7824,802 @@
           </a:p>
         </p:txBody>
       </p:sp>
-      <p:sp>
-        <p:nvSpPr>
-          <p:cNvPr id="4" name="Title 1">
+      <p:grpSp>
+        <p:nvGrpSpPr>
+          <p:cNvPr id="8" name="Group 7">
             <a:extLst>
               <a:ext uri="{FF2B5EF4-FFF2-40B4-BE49-F238E27FC236}">
-                <a16:creationId xmlns:a16="http://schemas.microsoft.com/office/drawing/2014/main" id="{441CA85D-2C97-47C8-A2EC-D6CE2C902937}"/>
+                <a16:creationId xmlns:a16="http://schemas.microsoft.com/office/drawing/2014/main" id="{E5107CCE-9419-4554-943D-5D0E8AAEA3D4}"/>
               </a:ext>
             </a:extLst>
           </p:cNvPr>
-          <p:cNvSpPr txBox="1">
-            <a:spLocks/>
-          </p:cNvSpPr>
+          <p:cNvGrpSpPr/>
           <p:nvPr/>
-        </p:nvSpPr>
-        <p:spPr>
+        </p:nvGrpSpPr>
+        <p:grpSpPr>
           <a:xfrm>
-            <a:off x="684212" y="2495550"/>
-            <a:ext cx="8534400" cy="1485483"/>
+            <a:off x="677439" y="4351444"/>
+            <a:ext cx="8534400" cy="2019297"/>
+            <a:chOff x="684212" y="2495550"/>
+            <a:chExt cx="8534400" cy="2019297"/>
           </a:xfrm>
-          <a:prstGeom prst="rect">
-            <a:avLst/>
-          </a:prstGeom>
-          <a:effectLst/>
-        </p:spPr>
-        <p:txBody>
-          <a:bodyPr vert="horz" lIns="91440" tIns="45720" rIns="91440" bIns="45720" rtlCol="0" anchor="ctr">
-            <a:normAutofit/>
-          </a:bodyPr>
-          <a:lstStyle>
-            <a:lvl1pPr algn="l" defTabSz="457200" rtl="0" eaLnBrk="1" latinLnBrk="0" hangingPunct="1">
-              <a:spcBef>
-                <a:spcPct val="0"/>
-              </a:spcBef>
-              <a:buNone/>
-              <a:defRPr sz="3600" kern="1200" cap="all">
-                <a:ln w="3175" cmpd="sng">
-                  <a:noFill/>
-                </a:ln>
-                <a:solidFill>
+        </p:grpSpPr>
+        <p:sp>
+          <p:nvSpPr>
+            <p:cNvPr id="4" name="Title 1">
+              <a:extLst>
+                <a:ext uri="{FF2B5EF4-FFF2-40B4-BE49-F238E27FC236}">
+                  <a16:creationId xmlns:a16="http://schemas.microsoft.com/office/drawing/2014/main" id="{441CA85D-2C97-47C8-A2EC-D6CE2C902937}"/>
+                </a:ext>
+              </a:extLst>
+            </p:cNvPr>
+            <p:cNvSpPr txBox="1">
+              <a:spLocks/>
+            </p:cNvSpPr>
+            <p:nvPr/>
+          </p:nvSpPr>
+          <p:spPr>
+            <a:xfrm>
+              <a:off x="684212" y="2495550"/>
+              <a:ext cx="8534400" cy="1485483"/>
+            </a:xfrm>
+            <a:prstGeom prst="rect">
+              <a:avLst/>
+            </a:prstGeom>
+            <a:effectLst/>
+          </p:spPr>
+          <p:txBody>
+            <a:bodyPr vert="horz" lIns="91440" tIns="45720" rIns="91440" bIns="45720" rtlCol="0" anchor="ctr">
+              <a:normAutofit/>
+            </a:bodyPr>
+            <a:lstStyle>
+              <a:lvl1pPr algn="l" defTabSz="457200" rtl="0" eaLnBrk="1" latinLnBrk="0" hangingPunct="1">
+                <a:spcBef>
+                  <a:spcPct val="0"/>
+                </a:spcBef>
+                <a:buNone/>
+                <a:defRPr sz="3600" kern="1200" cap="all">
+                  <a:ln w="3175" cmpd="sng">
+                    <a:noFill/>
+                  </a:ln>
+                  <a:solidFill>
+                    <a:schemeClr val="tx1"/>
+                  </a:solidFill>
+                  <a:effectLst/>
+                  <a:latin typeface="+mj-lt"/>
+                  <a:ea typeface="+mj-ea"/>
+                  <a:cs typeface="+mj-cs"/>
+                </a:defRPr>
+              </a:lvl1pPr>
+              <a:lvl2pPr eaLnBrk="1" hangingPunct="1">
+                <a:defRPr>
+                  <a:solidFill>
+                    <a:schemeClr val="tx2"/>
+                  </a:solidFill>
+                </a:defRPr>
+              </a:lvl2pPr>
+              <a:lvl3pPr eaLnBrk="1" hangingPunct="1">
+                <a:defRPr>
+                  <a:solidFill>
+                    <a:schemeClr val="tx2"/>
+                  </a:solidFill>
+                </a:defRPr>
+              </a:lvl3pPr>
+              <a:lvl4pPr eaLnBrk="1" hangingPunct="1">
+                <a:defRPr>
+                  <a:solidFill>
+                    <a:schemeClr val="tx2"/>
+                  </a:solidFill>
+                </a:defRPr>
+              </a:lvl4pPr>
+              <a:lvl5pPr eaLnBrk="1" hangingPunct="1">
+                <a:defRPr>
+                  <a:solidFill>
+                    <a:schemeClr val="tx2"/>
+                  </a:solidFill>
+                </a:defRPr>
+              </a:lvl5pPr>
+              <a:lvl6pPr eaLnBrk="1" hangingPunct="1">
+                <a:defRPr>
+                  <a:solidFill>
+                    <a:schemeClr val="tx2"/>
+                  </a:solidFill>
+                </a:defRPr>
+              </a:lvl6pPr>
+              <a:lvl7pPr eaLnBrk="1" hangingPunct="1">
+                <a:defRPr>
+                  <a:solidFill>
+                    <a:schemeClr val="tx2"/>
+                  </a:solidFill>
+                </a:defRPr>
+              </a:lvl7pPr>
+              <a:lvl8pPr eaLnBrk="1" hangingPunct="1">
+                <a:defRPr>
+                  <a:solidFill>
+                    <a:schemeClr val="tx2"/>
+                  </a:solidFill>
+                </a:defRPr>
+              </a:lvl8pPr>
+              <a:lvl9pPr eaLnBrk="1" hangingPunct="1">
+                <a:defRPr>
+                  <a:solidFill>
+                    <a:schemeClr val="tx2"/>
+                  </a:solidFill>
+                </a:defRPr>
+              </a:lvl9pPr>
+            </a:lstStyle>
+            <a:p>
+              <a:r>
+                <a:rPr lang="en-US" dirty="0"/>
+                <a:t>My Hope</a:t>
+              </a:r>
+            </a:p>
+          </p:txBody>
+        </p:sp>
+        <p:sp>
+          <p:nvSpPr>
+            <p:cNvPr id="5" name="Content Placeholder 2">
+              <a:extLst>
+                <a:ext uri="{FF2B5EF4-FFF2-40B4-BE49-F238E27FC236}">
+                  <a16:creationId xmlns:a16="http://schemas.microsoft.com/office/drawing/2014/main" id="{09AB05E2-0DCE-4B44-80C1-D4594826B05E}"/>
+                </a:ext>
+              </a:extLst>
+            </p:cNvPr>
+            <p:cNvSpPr txBox="1">
+              <a:spLocks/>
+            </p:cNvSpPr>
+            <p:nvPr/>
+          </p:nvSpPr>
+          <p:spPr>
+            <a:xfrm>
+              <a:off x="684212" y="3615593"/>
+              <a:ext cx="8534400" cy="899254"/>
+            </a:xfrm>
+            <a:prstGeom prst="rect">
+              <a:avLst/>
+            </a:prstGeom>
+          </p:spPr>
+          <p:txBody>
+            <a:bodyPr vert="horz" lIns="91440" tIns="45720" rIns="91440" bIns="45720" rtlCol="0" anchor="ctr">
+              <a:normAutofit/>
+            </a:bodyPr>
+            <a:lstStyle>
+              <a:lvl1pPr marL="285750" indent="-285750" algn="l" defTabSz="457200" rtl="0" eaLnBrk="1" latinLnBrk="0" hangingPunct="1">
+                <a:spcBef>
+                  <a:spcPct val="20000"/>
+                </a:spcBef>
+                <a:spcAft>
+                  <a:spcPts val="600"/>
+                </a:spcAft>
+                <a:buClr>
                   <a:schemeClr val="tx1"/>
-                </a:solidFill>
-                <a:effectLst/>
-                <a:latin typeface="+mj-lt"/>
-                <a:ea typeface="+mj-ea"/>
-                <a:cs typeface="+mj-cs"/>
-              </a:defRPr>
-            </a:lvl1pPr>
-            <a:lvl2pPr eaLnBrk="1" hangingPunct="1">
-              <a:defRPr>
-                <a:solidFill>
-                  <a:schemeClr val="tx2"/>
-                </a:solidFill>
-              </a:defRPr>
-            </a:lvl2pPr>
-            <a:lvl3pPr eaLnBrk="1" hangingPunct="1">
-              <a:defRPr>
-                <a:solidFill>
-                  <a:schemeClr val="tx2"/>
-                </a:solidFill>
-              </a:defRPr>
-            </a:lvl3pPr>
-            <a:lvl4pPr eaLnBrk="1" hangingPunct="1">
-              <a:defRPr>
-                <a:solidFill>
-                  <a:schemeClr val="tx2"/>
-                </a:solidFill>
-              </a:defRPr>
-            </a:lvl4pPr>
-            <a:lvl5pPr eaLnBrk="1" hangingPunct="1">
-              <a:defRPr>
-                <a:solidFill>
-                  <a:schemeClr val="tx2"/>
-                </a:solidFill>
-              </a:defRPr>
-            </a:lvl5pPr>
-            <a:lvl6pPr eaLnBrk="1" hangingPunct="1">
-              <a:defRPr>
-                <a:solidFill>
-                  <a:schemeClr val="tx2"/>
-                </a:solidFill>
-              </a:defRPr>
-            </a:lvl6pPr>
-            <a:lvl7pPr eaLnBrk="1" hangingPunct="1">
-              <a:defRPr>
-                <a:solidFill>
-                  <a:schemeClr val="tx2"/>
-                </a:solidFill>
-              </a:defRPr>
-            </a:lvl7pPr>
-            <a:lvl8pPr eaLnBrk="1" hangingPunct="1">
-              <a:defRPr>
-                <a:solidFill>
-                  <a:schemeClr val="tx2"/>
-                </a:solidFill>
-              </a:defRPr>
-            </a:lvl8pPr>
-            <a:lvl9pPr eaLnBrk="1" hangingPunct="1">
-              <a:defRPr>
-                <a:solidFill>
-                  <a:schemeClr val="tx2"/>
-                </a:solidFill>
-              </a:defRPr>
-            </a:lvl9pPr>
-          </a:lstStyle>
-          <a:p>
-            <a:r>
-              <a:rPr lang="en-US" dirty="0"/>
-              <a:t>My Hope</a:t>
-            </a:r>
-          </a:p>
-        </p:txBody>
-      </p:sp>
-      <p:sp>
-        <p:nvSpPr>
-          <p:cNvPr id="5" name="Content Placeholder 2">
+                </a:buClr>
+                <a:buSzPct val="80000"/>
+                <a:buFont typeface="Wingdings 3" panose="05040102010807070707" pitchFamily="18" charset="2"/>
+                <a:buChar char=""/>
+                <a:defRPr sz="2000" kern="1200" cap="none">
+                  <a:solidFill>
+                    <a:schemeClr val="bg2">
+                      <a:lumMod val="50000"/>
+                    </a:schemeClr>
+                  </a:solidFill>
+                  <a:effectLst/>
+                  <a:latin typeface="+mn-lt"/>
+                  <a:ea typeface="+mn-ea"/>
+                  <a:cs typeface="+mn-cs"/>
+                </a:defRPr>
+              </a:lvl1pPr>
+              <a:lvl2pPr marL="742950" indent="-285750" algn="l" defTabSz="457200" rtl="0" eaLnBrk="1" latinLnBrk="0" hangingPunct="1">
+                <a:spcBef>
+                  <a:spcPct val="20000"/>
+                </a:spcBef>
+                <a:spcAft>
+                  <a:spcPts val="600"/>
+                </a:spcAft>
+                <a:buClr>
+                  <a:schemeClr val="tx1"/>
+                </a:buClr>
+                <a:buSzPct val="80000"/>
+                <a:buFont typeface="Wingdings 3" panose="05040102010807070707" pitchFamily="18" charset="2"/>
+                <a:buChar char=""/>
+                <a:defRPr sz="1800" kern="1200" cap="none">
+                  <a:solidFill>
+                    <a:schemeClr val="bg2">
+                      <a:lumMod val="50000"/>
+                    </a:schemeClr>
+                  </a:solidFill>
+                  <a:effectLst/>
+                  <a:latin typeface="+mn-lt"/>
+                  <a:ea typeface="+mn-ea"/>
+                  <a:cs typeface="+mn-cs"/>
+                </a:defRPr>
+              </a:lvl2pPr>
+              <a:lvl3pPr marL="1200150" indent="-285750" algn="l" defTabSz="457200" rtl="0" eaLnBrk="1" latinLnBrk="0" hangingPunct="1">
+                <a:spcBef>
+                  <a:spcPct val="20000"/>
+                </a:spcBef>
+                <a:spcAft>
+                  <a:spcPts val="600"/>
+                </a:spcAft>
+                <a:buClr>
+                  <a:schemeClr val="tx1"/>
+                </a:buClr>
+                <a:buSzPct val="80000"/>
+                <a:buFont typeface="Wingdings 3" panose="05040102010807070707" pitchFamily="18" charset="2"/>
+                <a:buChar char=""/>
+                <a:defRPr sz="1600" kern="1200" cap="none">
+                  <a:solidFill>
+                    <a:schemeClr val="bg2">
+                      <a:lumMod val="50000"/>
+                    </a:schemeClr>
+                  </a:solidFill>
+                  <a:effectLst/>
+                  <a:latin typeface="+mn-lt"/>
+                  <a:ea typeface="+mn-ea"/>
+                  <a:cs typeface="+mn-cs"/>
+                </a:defRPr>
+              </a:lvl3pPr>
+              <a:lvl4pPr marL="1543050" indent="-171450" algn="l" defTabSz="457200" rtl="0" eaLnBrk="1" latinLnBrk="0" hangingPunct="1">
+                <a:spcBef>
+                  <a:spcPct val="20000"/>
+                </a:spcBef>
+                <a:spcAft>
+                  <a:spcPts val="600"/>
+                </a:spcAft>
+                <a:buClr>
+                  <a:schemeClr val="tx1"/>
+                </a:buClr>
+                <a:buSzPct val="80000"/>
+                <a:buFont typeface="Wingdings 3" panose="05040102010807070707" pitchFamily="18" charset="2"/>
+                <a:buChar char=""/>
+                <a:defRPr sz="1400" kern="1200" cap="none">
+                  <a:solidFill>
+                    <a:schemeClr val="bg2">
+                      <a:lumMod val="50000"/>
+                    </a:schemeClr>
+                  </a:solidFill>
+                  <a:effectLst/>
+                  <a:latin typeface="+mn-lt"/>
+                  <a:ea typeface="+mn-ea"/>
+                  <a:cs typeface="+mn-cs"/>
+                </a:defRPr>
+              </a:lvl4pPr>
+              <a:lvl5pPr marL="2114550" indent="-285750" algn="l" defTabSz="457200" rtl="0" eaLnBrk="1" latinLnBrk="0" hangingPunct="1">
+                <a:spcBef>
+                  <a:spcPct val="20000"/>
+                </a:spcBef>
+                <a:spcAft>
+                  <a:spcPts val="600"/>
+                </a:spcAft>
+                <a:buClr>
+                  <a:schemeClr val="tx1"/>
+                </a:buClr>
+                <a:buSzPct val="80000"/>
+                <a:buFont typeface="Wingdings 3" panose="05040102010807070707" pitchFamily="18" charset="2"/>
+                <a:buChar char=""/>
+                <a:defRPr sz="1400" kern="1200" cap="none">
+                  <a:solidFill>
+                    <a:schemeClr val="bg2">
+                      <a:lumMod val="50000"/>
+                    </a:schemeClr>
+                  </a:solidFill>
+                  <a:effectLst/>
+                  <a:latin typeface="+mn-lt"/>
+                  <a:ea typeface="+mn-ea"/>
+                  <a:cs typeface="+mn-cs"/>
+                </a:defRPr>
+              </a:lvl5pPr>
+              <a:lvl6pPr marL="2514600" indent="-228600" algn="l" defTabSz="457200" rtl="0" eaLnBrk="1" latinLnBrk="0" hangingPunct="1">
+                <a:spcBef>
+                  <a:spcPct val="20000"/>
+                </a:spcBef>
+                <a:spcAft>
+                  <a:spcPts val="600"/>
+                </a:spcAft>
+                <a:buClr>
+                  <a:schemeClr val="tx1"/>
+                </a:buClr>
+                <a:buSzPct val="80000"/>
+                <a:buFont typeface="Wingdings 3" panose="05040102010807070707" pitchFamily="18" charset="2"/>
+                <a:buChar char=""/>
+                <a:defRPr sz="1400" kern="1200" cap="none">
+                  <a:solidFill>
+                    <a:schemeClr val="bg2">
+                      <a:lumMod val="50000"/>
+                    </a:schemeClr>
+                  </a:solidFill>
+                  <a:effectLst/>
+                  <a:latin typeface="+mn-lt"/>
+                  <a:ea typeface="+mn-ea"/>
+                  <a:cs typeface="+mn-cs"/>
+                </a:defRPr>
+              </a:lvl6pPr>
+              <a:lvl7pPr marL="2971800" indent="-228600" algn="l" defTabSz="457200" rtl="0" eaLnBrk="1" latinLnBrk="0" hangingPunct="1">
+                <a:spcBef>
+                  <a:spcPct val="20000"/>
+                </a:spcBef>
+                <a:spcAft>
+                  <a:spcPts val="600"/>
+                </a:spcAft>
+                <a:buClr>
+                  <a:schemeClr val="tx1"/>
+                </a:buClr>
+                <a:buSzPct val="80000"/>
+                <a:buFont typeface="Wingdings 3" panose="05040102010807070707" pitchFamily="18" charset="2"/>
+                <a:buChar char=""/>
+                <a:defRPr sz="1400" kern="1200" cap="none">
+                  <a:solidFill>
+                    <a:schemeClr val="bg2">
+                      <a:lumMod val="50000"/>
+                    </a:schemeClr>
+                  </a:solidFill>
+                  <a:effectLst/>
+                  <a:latin typeface="+mn-lt"/>
+                  <a:ea typeface="+mn-ea"/>
+                  <a:cs typeface="+mn-cs"/>
+                </a:defRPr>
+              </a:lvl7pPr>
+              <a:lvl8pPr marL="3429000" indent="-228600" algn="l" defTabSz="457200" rtl="0" eaLnBrk="1" latinLnBrk="0" hangingPunct="1">
+                <a:spcBef>
+                  <a:spcPct val="20000"/>
+                </a:spcBef>
+                <a:spcAft>
+                  <a:spcPts val="600"/>
+                </a:spcAft>
+                <a:buClr>
+                  <a:schemeClr val="tx1"/>
+                </a:buClr>
+                <a:buSzPct val="80000"/>
+                <a:buFont typeface="Wingdings 3" panose="05040102010807070707" pitchFamily="18" charset="2"/>
+                <a:buChar char=""/>
+                <a:defRPr sz="1400" kern="1200" cap="none">
+                  <a:solidFill>
+                    <a:schemeClr val="bg2">
+                      <a:lumMod val="50000"/>
+                    </a:schemeClr>
+                  </a:solidFill>
+                  <a:effectLst/>
+                  <a:latin typeface="+mn-lt"/>
+                  <a:ea typeface="+mn-ea"/>
+                  <a:cs typeface="+mn-cs"/>
+                </a:defRPr>
+              </a:lvl8pPr>
+              <a:lvl9pPr marL="3886200" indent="-228600" algn="l" defTabSz="457200" rtl="0" eaLnBrk="1" latinLnBrk="0" hangingPunct="1">
+                <a:spcBef>
+                  <a:spcPct val="20000"/>
+                </a:spcBef>
+                <a:spcAft>
+                  <a:spcPts val="600"/>
+                </a:spcAft>
+                <a:buClr>
+                  <a:schemeClr val="tx1"/>
+                </a:buClr>
+                <a:buSzPct val="80000"/>
+                <a:buFont typeface="Wingdings 3" panose="05040102010807070707" pitchFamily="18" charset="2"/>
+                <a:buChar char=""/>
+                <a:defRPr sz="1400" kern="1200" cap="none">
+                  <a:solidFill>
+                    <a:schemeClr val="bg2">
+                      <a:lumMod val="50000"/>
+                    </a:schemeClr>
+                  </a:solidFill>
+                  <a:effectLst/>
+                  <a:latin typeface="+mn-lt"/>
+                  <a:ea typeface="+mn-ea"/>
+                  <a:cs typeface="+mn-cs"/>
+                </a:defRPr>
+              </a:lvl9pPr>
+            </a:lstStyle>
+            <a:p>
+              <a:r>
+                <a:rPr lang="en-US" dirty="0"/>
+                <a:t>That you will leave this session with an appreciation for R’s utility and a clear idea of where to turn if you’d like to learn more.</a:t>
+              </a:r>
+            </a:p>
+          </p:txBody>
+        </p:sp>
+      </p:grpSp>
+      <p:grpSp>
+        <p:nvGrpSpPr>
+          <p:cNvPr id="9" name="Group 8">
             <a:extLst>
               <a:ext uri="{FF2B5EF4-FFF2-40B4-BE49-F238E27FC236}">
-                <a16:creationId xmlns:a16="http://schemas.microsoft.com/office/drawing/2014/main" id="{09AB05E2-0DCE-4B44-80C1-D4594826B05E}"/>
+                <a16:creationId xmlns:a16="http://schemas.microsoft.com/office/drawing/2014/main" id="{F46C4FC2-8D19-4291-B75C-38FFCE2B56CE}"/>
               </a:ext>
             </a:extLst>
           </p:cNvPr>
-          <p:cNvSpPr txBox="1">
-            <a:spLocks/>
-          </p:cNvSpPr>
+          <p:cNvGrpSpPr/>
           <p:nvPr/>
-        </p:nvSpPr>
-        <p:spPr>
+        </p:nvGrpSpPr>
+        <p:grpSpPr>
           <a:xfrm>
-            <a:off x="684212" y="3615593"/>
-            <a:ext cx="8534400" cy="899254"/>
+            <a:off x="685694" y="2744983"/>
+            <a:ext cx="8541544" cy="1816591"/>
+            <a:chOff x="712787" y="4600876"/>
+            <a:chExt cx="8541544" cy="1816591"/>
           </a:xfrm>
-          <a:prstGeom prst="rect">
-            <a:avLst/>
-          </a:prstGeom>
-        </p:spPr>
-        <p:txBody>
-          <a:bodyPr vert="horz" lIns="91440" tIns="45720" rIns="91440" bIns="45720" rtlCol="0" anchor="ctr">
-            <a:normAutofit/>
-          </a:bodyPr>
-          <a:lstStyle>
-            <a:lvl1pPr marL="285750" indent="-285750" algn="l" defTabSz="457200" rtl="0" eaLnBrk="1" latinLnBrk="0" hangingPunct="1">
-              <a:spcBef>
-                <a:spcPct val="20000"/>
-              </a:spcBef>
-              <a:spcAft>
-                <a:spcPts val="600"/>
-              </a:spcAft>
-              <a:buClr>
-                <a:schemeClr val="tx1"/>
-              </a:buClr>
-              <a:buSzPct val="80000"/>
-              <a:buFont typeface="Wingdings 3" panose="05040102010807070707" pitchFamily="18" charset="2"/>
-              <a:buChar char=""/>
-              <a:defRPr sz="2000" kern="1200" cap="none">
-                <a:solidFill>
-                  <a:schemeClr val="bg2">
-                    <a:lumMod val="50000"/>
-                  </a:schemeClr>
-                </a:solidFill>
-                <a:effectLst/>
-                <a:latin typeface="+mn-lt"/>
-                <a:ea typeface="+mn-ea"/>
-                <a:cs typeface="+mn-cs"/>
-              </a:defRPr>
-            </a:lvl1pPr>
-            <a:lvl2pPr marL="742950" indent="-285750" algn="l" defTabSz="457200" rtl="0" eaLnBrk="1" latinLnBrk="0" hangingPunct="1">
-              <a:spcBef>
-                <a:spcPct val="20000"/>
-              </a:spcBef>
-              <a:spcAft>
-                <a:spcPts val="600"/>
-              </a:spcAft>
-              <a:buClr>
-                <a:schemeClr val="tx1"/>
-              </a:buClr>
-              <a:buSzPct val="80000"/>
-              <a:buFont typeface="Wingdings 3" panose="05040102010807070707" pitchFamily="18" charset="2"/>
-              <a:buChar char=""/>
-              <a:defRPr sz="1800" kern="1200" cap="none">
-                <a:solidFill>
-                  <a:schemeClr val="bg2">
-                    <a:lumMod val="50000"/>
-                  </a:schemeClr>
-                </a:solidFill>
-                <a:effectLst/>
-                <a:latin typeface="+mn-lt"/>
-                <a:ea typeface="+mn-ea"/>
-                <a:cs typeface="+mn-cs"/>
-              </a:defRPr>
-            </a:lvl2pPr>
-            <a:lvl3pPr marL="1200150" indent="-285750" algn="l" defTabSz="457200" rtl="0" eaLnBrk="1" latinLnBrk="0" hangingPunct="1">
-              <a:spcBef>
-                <a:spcPct val="20000"/>
-              </a:spcBef>
-              <a:spcAft>
-                <a:spcPts val="600"/>
-              </a:spcAft>
-              <a:buClr>
-                <a:schemeClr val="tx1"/>
-              </a:buClr>
-              <a:buSzPct val="80000"/>
-              <a:buFont typeface="Wingdings 3" panose="05040102010807070707" pitchFamily="18" charset="2"/>
-              <a:buChar char=""/>
-              <a:defRPr sz="1600" kern="1200" cap="none">
-                <a:solidFill>
-                  <a:schemeClr val="bg2">
-                    <a:lumMod val="50000"/>
-                  </a:schemeClr>
-                </a:solidFill>
-                <a:effectLst/>
-                <a:latin typeface="+mn-lt"/>
-                <a:ea typeface="+mn-ea"/>
-                <a:cs typeface="+mn-cs"/>
-              </a:defRPr>
-            </a:lvl3pPr>
-            <a:lvl4pPr marL="1543050" indent="-171450" algn="l" defTabSz="457200" rtl="0" eaLnBrk="1" latinLnBrk="0" hangingPunct="1">
-              <a:spcBef>
-                <a:spcPct val="20000"/>
-              </a:spcBef>
-              <a:spcAft>
-                <a:spcPts val="600"/>
-              </a:spcAft>
-              <a:buClr>
-                <a:schemeClr val="tx1"/>
-              </a:buClr>
-              <a:buSzPct val="80000"/>
-              <a:buFont typeface="Wingdings 3" panose="05040102010807070707" pitchFamily="18" charset="2"/>
-              <a:buChar char=""/>
-              <a:defRPr sz="1400" kern="1200" cap="none">
-                <a:solidFill>
-                  <a:schemeClr val="bg2">
-                    <a:lumMod val="50000"/>
-                  </a:schemeClr>
-                </a:solidFill>
-                <a:effectLst/>
-                <a:latin typeface="+mn-lt"/>
-                <a:ea typeface="+mn-ea"/>
-                <a:cs typeface="+mn-cs"/>
-              </a:defRPr>
-            </a:lvl4pPr>
-            <a:lvl5pPr marL="2114550" indent="-285750" algn="l" defTabSz="457200" rtl="0" eaLnBrk="1" latinLnBrk="0" hangingPunct="1">
-              <a:spcBef>
-                <a:spcPct val="20000"/>
-              </a:spcBef>
-              <a:spcAft>
-                <a:spcPts val="600"/>
-              </a:spcAft>
-              <a:buClr>
-                <a:schemeClr val="tx1"/>
-              </a:buClr>
-              <a:buSzPct val="80000"/>
-              <a:buFont typeface="Wingdings 3" panose="05040102010807070707" pitchFamily="18" charset="2"/>
-              <a:buChar char=""/>
-              <a:defRPr sz="1400" kern="1200" cap="none">
-                <a:solidFill>
-                  <a:schemeClr val="bg2">
-                    <a:lumMod val="50000"/>
-                  </a:schemeClr>
-                </a:solidFill>
-                <a:effectLst/>
-                <a:latin typeface="+mn-lt"/>
-                <a:ea typeface="+mn-ea"/>
-                <a:cs typeface="+mn-cs"/>
-              </a:defRPr>
-            </a:lvl5pPr>
-            <a:lvl6pPr marL="2514600" indent="-228600" algn="l" defTabSz="457200" rtl="0" eaLnBrk="1" latinLnBrk="0" hangingPunct="1">
-              <a:spcBef>
-                <a:spcPct val="20000"/>
-              </a:spcBef>
-              <a:spcAft>
-                <a:spcPts val="600"/>
-              </a:spcAft>
-              <a:buClr>
-                <a:schemeClr val="tx1"/>
-              </a:buClr>
-              <a:buSzPct val="80000"/>
-              <a:buFont typeface="Wingdings 3" panose="05040102010807070707" pitchFamily="18" charset="2"/>
-              <a:buChar char=""/>
-              <a:defRPr sz="1400" kern="1200" cap="none">
-                <a:solidFill>
-                  <a:schemeClr val="bg2">
-                    <a:lumMod val="50000"/>
-                  </a:schemeClr>
-                </a:solidFill>
-                <a:effectLst/>
-                <a:latin typeface="+mn-lt"/>
-                <a:ea typeface="+mn-ea"/>
-                <a:cs typeface="+mn-cs"/>
-              </a:defRPr>
-            </a:lvl6pPr>
-            <a:lvl7pPr marL="2971800" indent="-228600" algn="l" defTabSz="457200" rtl="0" eaLnBrk="1" latinLnBrk="0" hangingPunct="1">
-              <a:spcBef>
-                <a:spcPct val="20000"/>
-              </a:spcBef>
-              <a:spcAft>
-                <a:spcPts val="600"/>
-              </a:spcAft>
-              <a:buClr>
-                <a:schemeClr val="tx1"/>
-              </a:buClr>
-              <a:buSzPct val="80000"/>
-              <a:buFont typeface="Wingdings 3" panose="05040102010807070707" pitchFamily="18" charset="2"/>
-              <a:buChar char=""/>
-              <a:defRPr sz="1400" kern="1200" cap="none">
-                <a:solidFill>
-                  <a:schemeClr val="bg2">
-                    <a:lumMod val="50000"/>
-                  </a:schemeClr>
-                </a:solidFill>
-                <a:effectLst/>
-                <a:latin typeface="+mn-lt"/>
-                <a:ea typeface="+mn-ea"/>
-                <a:cs typeface="+mn-cs"/>
-              </a:defRPr>
-            </a:lvl7pPr>
-            <a:lvl8pPr marL="3429000" indent="-228600" algn="l" defTabSz="457200" rtl="0" eaLnBrk="1" latinLnBrk="0" hangingPunct="1">
-              <a:spcBef>
-                <a:spcPct val="20000"/>
-              </a:spcBef>
-              <a:spcAft>
-                <a:spcPts val="600"/>
-              </a:spcAft>
-              <a:buClr>
-                <a:schemeClr val="tx1"/>
-              </a:buClr>
-              <a:buSzPct val="80000"/>
-              <a:buFont typeface="Wingdings 3" panose="05040102010807070707" pitchFamily="18" charset="2"/>
-              <a:buChar char=""/>
-              <a:defRPr sz="1400" kern="1200" cap="none">
-                <a:solidFill>
-                  <a:schemeClr val="bg2">
-                    <a:lumMod val="50000"/>
-                  </a:schemeClr>
-                </a:solidFill>
-                <a:effectLst/>
-                <a:latin typeface="+mn-lt"/>
-                <a:ea typeface="+mn-ea"/>
-                <a:cs typeface="+mn-cs"/>
-              </a:defRPr>
-            </a:lvl8pPr>
-            <a:lvl9pPr marL="3886200" indent="-228600" algn="l" defTabSz="457200" rtl="0" eaLnBrk="1" latinLnBrk="0" hangingPunct="1">
-              <a:spcBef>
-                <a:spcPct val="20000"/>
-              </a:spcBef>
-              <a:spcAft>
-                <a:spcPts val="600"/>
-              </a:spcAft>
-              <a:buClr>
-                <a:schemeClr val="tx1"/>
-              </a:buClr>
-              <a:buSzPct val="80000"/>
-              <a:buFont typeface="Wingdings 3" panose="05040102010807070707" pitchFamily="18" charset="2"/>
-              <a:buChar char=""/>
-              <a:defRPr sz="1400" kern="1200" cap="none">
-                <a:solidFill>
-                  <a:schemeClr val="bg2">
-                    <a:lumMod val="50000"/>
-                  </a:schemeClr>
-                </a:solidFill>
-                <a:effectLst/>
-                <a:latin typeface="+mn-lt"/>
-                <a:ea typeface="+mn-ea"/>
-                <a:cs typeface="+mn-cs"/>
-              </a:defRPr>
-            </a:lvl9pPr>
-          </a:lstStyle>
-          <a:p>
-            <a:r>
-              <a:rPr lang="en-US" dirty="0"/>
-              <a:t>That you will leave this session with an appreciation for R’s utility and a clear idea of where to turn if you’d like to learn more.</a:t>
-            </a:r>
-          </a:p>
-        </p:txBody>
-      </p:sp>
-      <p:sp>
-        <p:nvSpPr>
-          <p:cNvPr id="6" name="Title 1">
-            <a:extLst>
-              <a:ext uri="{FF2B5EF4-FFF2-40B4-BE49-F238E27FC236}">
-                <a16:creationId xmlns:a16="http://schemas.microsoft.com/office/drawing/2014/main" id="{D88429BB-EA8B-449E-BBF6-1B83431AF2E7}"/>
-              </a:ext>
-            </a:extLst>
-          </p:cNvPr>
-          <p:cNvSpPr txBox="1">
-            <a:spLocks/>
-          </p:cNvSpPr>
-          <p:nvPr/>
-        </p:nvSpPr>
-        <p:spPr>
-          <a:xfrm>
-            <a:off x="719931" y="4600876"/>
-            <a:ext cx="8534400" cy="1004170"/>
-          </a:xfrm>
-          <a:prstGeom prst="rect">
-            <a:avLst/>
-          </a:prstGeom>
-          <a:effectLst/>
-        </p:spPr>
-        <p:txBody>
-          <a:bodyPr vert="horz" lIns="91440" tIns="45720" rIns="91440" bIns="45720" rtlCol="0" anchor="ctr">
-            <a:normAutofit/>
-          </a:bodyPr>
-          <a:lstStyle>
-            <a:lvl1pPr algn="l" defTabSz="457200" rtl="0" eaLnBrk="1" latinLnBrk="0" hangingPunct="1">
-              <a:spcBef>
-                <a:spcPct val="0"/>
-              </a:spcBef>
-              <a:buNone/>
-              <a:defRPr sz="3600" kern="1200" cap="all">
-                <a:ln w="3175" cmpd="sng">
-                  <a:noFill/>
-                </a:ln>
-                <a:solidFill>
+        </p:grpSpPr>
+        <p:sp>
+          <p:nvSpPr>
+            <p:cNvPr id="6" name="Title 1">
+              <a:extLst>
+                <a:ext uri="{FF2B5EF4-FFF2-40B4-BE49-F238E27FC236}">
+                  <a16:creationId xmlns:a16="http://schemas.microsoft.com/office/drawing/2014/main" id="{D88429BB-EA8B-449E-BBF6-1B83431AF2E7}"/>
+                </a:ext>
+              </a:extLst>
+            </p:cNvPr>
+            <p:cNvSpPr txBox="1">
+              <a:spLocks/>
+            </p:cNvSpPr>
+            <p:nvPr/>
+          </p:nvSpPr>
+          <p:spPr>
+            <a:xfrm>
+              <a:off x="719931" y="4600876"/>
+              <a:ext cx="8534400" cy="1004170"/>
+            </a:xfrm>
+            <a:prstGeom prst="rect">
+              <a:avLst/>
+            </a:prstGeom>
+            <a:effectLst/>
+          </p:spPr>
+          <p:txBody>
+            <a:bodyPr vert="horz" lIns="91440" tIns="45720" rIns="91440" bIns="45720" rtlCol="0" anchor="ctr">
+              <a:normAutofit/>
+            </a:bodyPr>
+            <a:lstStyle>
+              <a:lvl1pPr algn="l" defTabSz="457200" rtl="0" eaLnBrk="1" latinLnBrk="0" hangingPunct="1">
+                <a:spcBef>
+                  <a:spcPct val="0"/>
+                </a:spcBef>
+                <a:buNone/>
+                <a:defRPr sz="3600" kern="1200" cap="all">
+                  <a:ln w="3175" cmpd="sng">
+                    <a:noFill/>
+                  </a:ln>
+                  <a:solidFill>
+                    <a:schemeClr val="tx1"/>
+                  </a:solidFill>
+                  <a:effectLst/>
+                  <a:latin typeface="+mj-lt"/>
+                  <a:ea typeface="+mj-ea"/>
+                  <a:cs typeface="+mj-cs"/>
+                </a:defRPr>
+              </a:lvl1pPr>
+              <a:lvl2pPr eaLnBrk="1" hangingPunct="1">
+                <a:defRPr>
+                  <a:solidFill>
+                    <a:schemeClr val="tx2"/>
+                  </a:solidFill>
+                </a:defRPr>
+              </a:lvl2pPr>
+              <a:lvl3pPr eaLnBrk="1" hangingPunct="1">
+                <a:defRPr>
+                  <a:solidFill>
+                    <a:schemeClr val="tx2"/>
+                  </a:solidFill>
+                </a:defRPr>
+              </a:lvl3pPr>
+              <a:lvl4pPr eaLnBrk="1" hangingPunct="1">
+                <a:defRPr>
+                  <a:solidFill>
+                    <a:schemeClr val="tx2"/>
+                  </a:solidFill>
+                </a:defRPr>
+              </a:lvl4pPr>
+              <a:lvl5pPr eaLnBrk="1" hangingPunct="1">
+                <a:defRPr>
+                  <a:solidFill>
+                    <a:schemeClr val="tx2"/>
+                  </a:solidFill>
+                </a:defRPr>
+              </a:lvl5pPr>
+              <a:lvl6pPr eaLnBrk="1" hangingPunct="1">
+                <a:defRPr>
+                  <a:solidFill>
+                    <a:schemeClr val="tx2"/>
+                  </a:solidFill>
+                </a:defRPr>
+              </a:lvl6pPr>
+              <a:lvl7pPr eaLnBrk="1" hangingPunct="1">
+                <a:defRPr>
+                  <a:solidFill>
+                    <a:schemeClr val="tx2"/>
+                  </a:solidFill>
+                </a:defRPr>
+              </a:lvl7pPr>
+              <a:lvl8pPr eaLnBrk="1" hangingPunct="1">
+                <a:defRPr>
+                  <a:solidFill>
+                    <a:schemeClr val="tx2"/>
+                  </a:solidFill>
+                </a:defRPr>
+              </a:lvl8pPr>
+              <a:lvl9pPr eaLnBrk="1" hangingPunct="1">
+                <a:defRPr>
+                  <a:solidFill>
+                    <a:schemeClr val="tx2"/>
+                  </a:solidFill>
+                </a:defRPr>
+              </a:lvl9pPr>
+            </a:lstStyle>
+            <a:p>
+              <a:r>
+                <a:rPr lang="en-US" dirty="0"/>
+                <a:t>I do not intend…</a:t>
+              </a:r>
+            </a:p>
+          </p:txBody>
+        </p:sp>
+        <p:sp>
+          <p:nvSpPr>
+            <p:cNvPr id="7" name="Content Placeholder 2">
+              <a:extLst>
+                <a:ext uri="{FF2B5EF4-FFF2-40B4-BE49-F238E27FC236}">
+                  <a16:creationId xmlns:a16="http://schemas.microsoft.com/office/drawing/2014/main" id="{FEFB8064-23FA-42C6-85BB-0BC3800DFDFE}"/>
+                </a:ext>
+              </a:extLst>
+            </p:cNvPr>
+            <p:cNvSpPr txBox="1">
+              <a:spLocks/>
+            </p:cNvSpPr>
+            <p:nvPr/>
+          </p:nvSpPr>
+          <p:spPr>
+            <a:xfrm>
+              <a:off x="712787" y="5518213"/>
+              <a:ext cx="8534400" cy="899254"/>
+            </a:xfrm>
+            <a:prstGeom prst="rect">
+              <a:avLst/>
+            </a:prstGeom>
+          </p:spPr>
+          <p:txBody>
+            <a:bodyPr vert="horz" lIns="91440" tIns="45720" rIns="91440" bIns="45720" rtlCol="0" anchor="ctr">
+              <a:normAutofit/>
+            </a:bodyPr>
+            <a:lstStyle>
+              <a:lvl1pPr marL="285750" indent="-285750" algn="l" defTabSz="457200" rtl="0" eaLnBrk="1" latinLnBrk="0" hangingPunct="1">
+                <a:spcBef>
+                  <a:spcPct val="20000"/>
+                </a:spcBef>
+                <a:spcAft>
+                  <a:spcPts val="600"/>
+                </a:spcAft>
+                <a:buClr>
                   <a:schemeClr val="tx1"/>
-                </a:solidFill>
-                <a:effectLst/>
-                <a:latin typeface="+mj-lt"/>
-                <a:ea typeface="+mj-ea"/>
-                <a:cs typeface="+mj-cs"/>
-              </a:defRPr>
-            </a:lvl1pPr>
-            <a:lvl2pPr eaLnBrk="1" hangingPunct="1">
-              <a:defRPr>
-                <a:solidFill>
-                  <a:schemeClr val="tx2"/>
-                </a:solidFill>
-              </a:defRPr>
-            </a:lvl2pPr>
-            <a:lvl3pPr eaLnBrk="1" hangingPunct="1">
-              <a:defRPr>
-                <a:solidFill>
-                  <a:schemeClr val="tx2"/>
-                </a:solidFill>
-              </a:defRPr>
-            </a:lvl3pPr>
-            <a:lvl4pPr eaLnBrk="1" hangingPunct="1">
-              <a:defRPr>
-                <a:solidFill>
-                  <a:schemeClr val="tx2"/>
-                </a:solidFill>
-              </a:defRPr>
-            </a:lvl4pPr>
-            <a:lvl5pPr eaLnBrk="1" hangingPunct="1">
-              <a:defRPr>
-                <a:solidFill>
-                  <a:schemeClr val="tx2"/>
-                </a:solidFill>
-              </a:defRPr>
-            </a:lvl5pPr>
-            <a:lvl6pPr eaLnBrk="1" hangingPunct="1">
-              <a:defRPr>
-                <a:solidFill>
-                  <a:schemeClr val="tx2"/>
-                </a:solidFill>
-              </a:defRPr>
-            </a:lvl6pPr>
-            <a:lvl7pPr eaLnBrk="1" hangingPunct="1">
-              <a:defRPr>
-                <a:solidFill>
-                  <a:schemeClr val="tx2"/>
-                </a:solidFill>
-              </a:defRPr>
-            </a:lvl7pPr>
-            <a:lvl8pPr eaLnBrk="1" hangingPunct="1">
-              <a:defRPr>
-                <a:solidFill>
-                  <a:schemeClr val="tx2"/>
-                </a:solidFill>
-              </a:defRPr>
-            </a:lvl8pPr>
-            <a:lvl9pPr eaLnBrk="1" hangingPunct="1">
-              <a:defRPr>
-                <a:solidFill>
-                  <a:schemeClr val="tx2"/>
-                </a:solidFill>
-              </a:defRPr>
-            </a:lvl9pPr>
-          </a:lstStyle>
-          <a:p>
-            <a:r>
-              <a:rPr lang="en-US" dirty="0"/>
-              <a:t>I do not intend…</a:t>
-            </a:r>
-          </a:p>
-        </p:txBody>
-      </p:sp>
-      <p:sp>
-        <p:nvSpPr>
-          <p:cNvPr id="7" name="Content Placeholder 2">
-            <a:extLst>
-              <a:ext uri="{FF2B5EF4-FFF2-40B4-BE49-F238E27FC236}">
-                <a16:creationId xmlns:a16="http://schemas.microsoft.com/office/drawing/2014/main" id="{FEFB8064-23FA-42C6-85BB-0BC3800DFDFE}"/>
-              </a:ext>
-            </a:extLst>
-          </p:cNvPr>
-          <p:cNvSpPr txBox="1">
-            <a:spLocks/>
-          </p:cNvSpPr>
-          <p:nvPr/>
-        </p:nvSpPr>
-        <p:spPr>
-          <a:xfrm>
-            <a:off x="712787" y="5518213"/>
-            <a:ext cx="8534400" cy="899254"/>
-          </a:xfrm>
-          <a:prstGeom prst="rect">
-            <a:avLst/>
-          </a:prstGeom>
-        </p:spPr>
-        <p:txBody>
-          <a:bodyPr vert="horz" lIns="91440" tIns="45720" rIns="91440" bIns="45720" rtlCol="0" anchor="ctr">
-            <a:normAutofit/>
-          </a:bodyPr>
-          <a:lstStyle>
-            <a:lvl1pPr marL="285750" indent="-285750" algn="l" defTabSz="457200" rtl="0" eaLnBrk="1" latinLnBrk="0" hangingPunct="1">
-              <a:spcBef>
-                <a:spcPct val="20000"/>
-              </a:spcBef>
-              <a:spcAft>
-                <a:spcPts val="600"/>
-              </a:spcAft>
-              <a:buClr>
-                <a:schemeClr val="tx1"/>
-              </a:buClr>
-              <a:buSzPct val="80000"/>
-              <a:buFont typeface="Wingdings 3" panose="05040102010807070707" pitchFamily="18" charset="2"/>
-              <a:buChar char=""/>
-              <a:defRPr sz="2000" kern="1200" cap="none">
-                <a:solidFill>
-                  <a:schemeClr val="bg2">
-                    <a:lumMod val="50000"/>
-                  </a:schemeClr>
-                </a:solidFill>
-                <a:effectLst/>
-                <a:latin typeface="+mn-lt"/>
-                <a:ea typeface="+mn-ea"/>
-                <a:cs typeface="+mn-cs"/>
-              </a:defRPr>
-            </a:lvl1pPr>
-            <a:lvl2pPr marL="742950" indent="-285750" algn="l" defTabSz="457200" rtl="0" eaLnBrk="1" latinLnBrk="0" hangingPunct="1">
-              <a:spcBef>
-                <a:spcPct val="20000"/>
-              </a:spcBef>
-              <a:spcAft>
-                <a:spcPts val="600"/>
-              </a:spcAft>
-              <a:buClr>
-                <a:schemeClr val="tx1"/>
-              </a:buClr>
-              <a:buSzPct val="80000"/>
-              <a:buFont typeface="Wingdings 3" panose="05040102010807070707" pitchFamily="18" charset="2"/>
-              <a:buChar char=""/>
-              <a:defRPr sz="1800" kern="1200" cap="none">
-                <a:solidFill>
-                  <a:schemeClr val="bg2">
-                    <a:lumMod val="50000"/>
-                  </a:schemeClr>
-                </a:solidFill>
-                <a:effectLst/>
-                <a:latin typeface="+mn-lt"/>
-                <a:ea typeface="+mn-ea"/>
-                <a:cs typeface="+mn-cs"/>
-              </a:defRPr>
-            </a:lvl2pPr>
-            <a:lvl3pPr marL="1200150" indent="-285750" algn="l" defTabSz="457200" rtl="0" eaLnBrk="1" latinLnBrk="0" hangingPunct="1">
-              <a:spcBef>
-                <a:spcPct val="20000"/>
-              </a:spcBef>
-              <a:spcAft>
-                <a:spcPts val="600"/>
-              </a:spcAft>
-              <a:buClr>
-                <a:schemeClr val="tx1"/>
-              </a:buClr>
-              <a:buSzPct val="80000"/>
-              <a:buFont typeface="Wingdings 3" panose="05040102010807070707" pitchFamily="18" charset="2"/>
-              <a:buChar char=""/>
-              <a:defRPr sz="1600" kern="1200" cap="none">
-                <a:solidFill>
-                  <a:schemeClr val="bg2">
-                    <a:lumMod val="50000"/>
-                  </a:schemeClr>
-                </a:solidFill>
-                <a:effectLst/>
-                <a:latin typeface="+mn-lt"/>
-                <a:ea typeface="+mn-ea"/>
-                <a:cs typeface="+mn-cs"/>
-              </a:defRPr>
-            </a:lvl3pPr>
-            <a:lvl4pPr marL="1543050" indent="-171450" algn="l" defTabSz="457200" rtl="0" eaLnBrk="1" latinLnBrk="0" hangingPunct="1">
-              <a:spcBef>
-                <a:spcPct val="20000"/>
-              </a:spcBef>
-              <a:spcAft>
-                <a:spcPts val="600"/>
-              </a:spcAft>
-              <a:buClr>
-                <a:schemeClr val="tx1"/>
-              </a:buClr>
-              <a:buSzPct val="80000"/>
-              <a:buFont typeface="Wingdings 3" panose="05040102010807070707" pitchFamily="18" charset="2"/>
-              <a:buChar char=""/>
-              <a:defRPr sz="1400" kern="1200" cap="none">
-                <a:solidFill>
-                  <a:schemeClr val="bg2">
-                    <a:lumMod val="50000"/>
-                  </a:schemeClr>
-                </a:solidFill>
-                <a:effectLst/>
-                <a:latin typeface="+mn-lt"/>
-                <a:ea typeface="+mn-ea"/>
-                <a:cs typeface="+mn-cs"/>
-              </a:defRPr>
-            </a:lvl4pPr>
-            <a:lvl5pPr marL="2114550" indent="-285750" algn="l" defTabSz="457200" rtl="0" eaLnBrk="1" latinLnBrk="0" hangingPunct="1">
-              <a:spcBef>
-                <a:spcPct val="20000"/>
-              </a:spcBef>
-              <a:spcAft>
-                <a:spcPts val="600"/>
-              </a:spcAft>
-              <a:buClr>
-                <a:schemeClr val="tx1"/>
-              </a:buClr>
-              <a:buSzPct val="80000"/>
-              <a:buFont typeface="Wingdings 3" panose="05040102010807070707" pitchFamily="18" charset="2"/>
-              <a:buChar char=""/>
-              <a:defRPr sz="1400" kern="1200" cap="none">
-                <a:solidFill>
-                  <a:schemeClr val="bg2">
-                    <a:lumMod val="50000"/>
-                  </a:schemeClr>
-                </a:solidFill>
-                <a:effectLst/>
-                <a:latin typeface="+mn-lt"/>
-                <a:ea typeface="+mn-ea"/>
-                <a:cs typeface="+mn-cs"/>
-              </a:defRPr>
-            </a:lvl5pPr>
-            <a:lvl6pPr marL="2514600" indent="-228600" algn="l" defTabSz="457200" rtl="0" eaLnBrk="1" latinLnBrk="0" hangingPunct="1">
-              <a:spcBef>
-                <a:spcPct val="20000"/>
-              </a:spcBef>
-              <a:spcAft>
-                <a:spcPts val="600"/>
-              </a:spcAft>
-              <a:buClr>
-                <a:schemeClr val="tx1"/>
-              </a:buClr>
-              <a:buSzPct val="80000"/>
-              <a:buFont typeface="Wingdings 3" panose="05040102010807070707" pitchFamily="18" charset="2"/>
-              <a:buChar char=""/>
-              <a:defRPr sz="1400" kern="1200" cap="none">
-                <a:solidFill>
-                  <a:schemeClr val="bg2">
-                    <a:lumMod val="50000"/>
-                  </a:schemeClr>
-                </a:solidFill>
-                <a:effectLst/>
-                <a:latin typeface="+mn-lt"/>
-                <a:ea typeface="+mn-ea"/>
-                <a:cs typeface="+mn-cs"/>
-              </a:defRPr>
-            </a:lvl6pPr>
-            <a:lvl7pPr marL="2971800" indent="-228600" algn="l" defTabSz="457200" rtl="0" eaLnBrk="1" latinLnBrk="0" hangingPunct="1">
-              <a:spcBef>
-                <a:spcPct val="20000"/>
-              </a:spcBef>
-              <a:spcAft>
-                <a:spcPts val="600"/>
-              </a:spcAft>
-              <a:buClr>
-                <a:schemeClr val="tx1"/>
-              </a:buClr>
-              <a:buSzPct val="80000"/>
-              <a:buFont typeface="Wingdings 3" panose="05040102010807070707" pitchFamily="18" charset="2"/>
-              <a:buChar char=""/>
-              <a:defRPr sz="1400" kern="1200" cap="none">
-                <a:solidFill>
-                  <a:schemeClr val="bg2">
-                    <a:lumMod val="50000"/>
-                  </a:schemeClr>
-                </a:solidFill>
-                <a:effectLst/>
-                <a:latin typeface="+mn-lt"/>
-                <a:ea typeface="+mn-ea"/>
-                <a:cs typeface="+mn-cs"/>
-              </a:defRPr>
-            </a:lvl7pPr>
-            <a:lvl8pPr marL="3429000" indent="-228600" algn="l" defTabSz="457200" rtl="0" eaLnBrk="1" latinLnBrk="0" hangingPunct="1">
-              <a:spcBef>
-                <a:spcPct val="20000"/>
-              </a:spcBef>
-              <a:spcAft>
-                <a:spcPts val="600"/>
-              </a:spcAft>
-              <a:buClr>
-                <a:schemeClr val="tx1"/>
-              </a:buClr>
-              <a:buSzPct val="80000"/>
-              <a:buFont typeface="Wingdings 3" panose="05040102010807070707" pitchFamily="18" charset="2"/>
-              <a:buChar char=""/>
-              <a:defRPr sz="1400" kern="1200" cap="none">
-                <a:solidFill>
-                  <a:schemeClr val="bg2">
-                    <a:lumMod val="50000"/>
-                  </a:schemeClr>
-                </a:solidFill>
-                <a:effectLst/>
-                <a:latin typeface="+mn-lt"/>
-                <a:ea typeface="+mn-ea"/>
-                <a:cs typeface="+mn-cs"/>
-              </a:defRPr>
-            </a:lvl8pPr>
-            <a:lvl9pPr marL="3886200" indent="-228600" algn="l" defTabSz="457200" rtl="0" eaLnBrk="1" latinLnBrk="0" hangingPunct="1">
-              <a:spcBef>
-                <a:spcPct val="20000"/>
-              </a:spcBef>
-              <a:spcAft>
-                <a:spcPts val="600"/>
-              </a:spcAft>
-              <a:buClr>
-                <a:schemeClr val="tx1"/>
-              </a:buClr>
-              <a:buSzPct val="80000"/>
-              <a:buFont typeface="Wingdings 3" panose="05040102010807070707" pitchFamily="18" charset="2"/>
-              <a:buChar char=""/>
-              <a:defRPr sz="1400" kern="1200" cap="none">
-                <a:solidFill>
-                  <a:schemeClr val="bg2">
-                    <a:lumMod val="50000"/>
-                  </a:schemeClr>
-                </a:solidFill>
-                <a:effectLst/>
-                <a:latin typeface="+mn-lt"/>
-                <a:ea typeface="+mn-ea"/>
-                <a:cs typeface="+mn-cs"/>
-              </a:defRPr>
-            </a:lvl9pPr>
-          </a:lstStyle>
-          <a:p>
-            <a:r>
-              <a:rPr lang="en-US" dirty="0"/>
-              <a:t>To make you R power-users in 2 hours.</a:t>
-            </a:r>
-          </a:p>
-          <a:p>
-            <a:r>
-              <a:rPr lang="en-US" dirty="0"/>
-              <a:t>To convince you that R is the one, true data science tool.</a:t>
-            </a:r>
-          </a:p>
-        </p:txBody>
-      </p:sp>
+                </a:buClr>
+                <a:buSzPct val="80000"/>
+                <a:buFont typeface="Wingdings 3" panose="05040102010807070707" pitchFamily="18" charset="2"/>
+                <a:buChar char=""/>
+                <a:defRPr sz="2000" kern="1200" cap="none">
+                  <a:solidFill>
+                    <a:schemeClr val="bg2">
+                      <a:lumMod val="50000"/>
+                    </a:schemeClr>
+                  </a:solidFill>
+                  <a:effectLst/>
+                  <a:latin typeface="+mn-lt"/>
+                  <a:ea typeface="+mn-ea"/>
+                  <a:cs typeface="+mn-cs"/>
+                </a:defRPr>
+              </a:lvl1pPr>
+              <a:lvl2pPr marL="742950" indent="-285750" algn="l" defTabSz="457200" rtl="0" eaLnBrk="1" latinLnBrk="0" hangingPunct="1">
+                <a:spcBef>
+                  <a:spcPct val="20000"/>
+                </a:spcBef>
+                <a:spcAft>
+                  <a:spcPts val="600"/>
+                </a:spcAft>
+                <a:buClr>
+                  <a:schemeClr val="tx1"/>
+                </a:buClr>
+                <a:buSzPct val="80000"/>
+                <a:buFont typeface="Wingdings 3" panose="05040102010807070707" pitchFamily="18" charset="2"/>
+                <a:buChar char=""/>
+                <a:defRPr sz="1800" kern="1200" cap="none">
+                  <a:solidFill>
+                    <a:schemeClr val="bg2">
+                      <a:lumMod val="50000"/>
+                    </a:schemeClr>
+                  </a:solidFill>
+                  <a:effectLst/>
+                  <a:latin typeface="+mn-lt"/>
+                  <a:ea typeface="+mn-ea"/>
+                  <a:cs typeface="+mn-cs"/>
+                </a:defRPr>
+              </a:lvl2pPr>
+              <a:lvl3pPr marL="1200150" indent="-285750" algn="l" defTabSz="457200" rtl="0" eaLnBrk="1" latinLnBrk="0" hangingPunct="1">
+                <a:spcBef>
+                  <a:spcPct val="20000"/>
+                </a:spcBef>
+                <a:spcAft>
+                  <a:spcPts val="600"/>
+                </a:spcAft>
+                <a:buClr>
+                  <a:schemeClr val="tx1"/>
+                </a:buClr>
+                <a:buSzPct val="80000"/>
+                <a:buFont typeface="Wingdings 3" panose="05040102010807070707" pitchFamily="18" charset="2"/>
+                <a:buChar char=""/>
+                <a:defRPr sz="1600" kern="1200" cap="none">
+                  <a:solidFill>
+                    <a:schemeClr val="bg2">
+                      <a:lumMod val="50000"/>
+                    </a:schemeClr>
+                  </a:solidFill>
+                  <a:effectLst/>
+                  <a:latin typeface="+mn-lt"/>
+                  <a:ea typeface="+mn-ea"/>
+                  <a:cs typeface="+mn-cs"/>
+                </a:defRPr>
+              </a:lvl3pPr>
+              <a:lvl4pPr marL="1543050" indent="-171450" algn="l" defTabSz="457200" rtl="0" eaLnBrk="1" latinLnBrk="0" hangingPunct="1">
+                <a:spcBef>
+                  <a:spcPct val="20000"/>
+                </a:spcBef>
+                <a:spcAft>
+                  <a:spcPts val="600"/>
+                </a:spcAft>
+                <a:buClr>
+                  <a:schemeClr val="tx1"/>
+                </a:buClr>
+                <a:buSzPct val="80000"/>
+                <a:buFont typeface="Wingdings 3" panose="05040102010807070707" pitchFamily="18" charset="2"/>
+                <a:buChar char=""/>
+                <a:defRPr sz="1400" kern="1200" cap="none">
+                  <a:solidFill>
+                    <a:schemeClr val="bg2">
+                      <a:lumMod val="50000"/>
+                    </a:schemeClr>
+                  </a:solidFill>
+                  <a:effectLst/>
+                  <a:latin typeface="+mn-lt"/>
+                  <a:ea typeface="+mn-ea"/>
+                  <a:cs typeface="+mn-cs"/>
+                </a:defRPr>
+              </a:lvl4pPr>
+              <a:lvl5pPr marL="2114550" indent="-285750" algn="l" defTabSz="457200" rtl="0" eaLnBrk="1" latinLnBrk="0" hangingPunct="1">
+                <a:spcBef>
+                  <a:spcPct val="20000"/>
+                </a:spcBef>
+                <a:spcAft>
+                  <a:spcPts val="600"/>
+                </a:spcAft>
+                <a:buClr>
+                  <a:schemeClr val="tx1"/>
+                </a:buClr>
+                <a:buSzPct val="80000"/>
+                <a:buFont typeface="Wingdings 3" panose="05040102010807070707" pitchFamily="18" charset="2"/>
+                <a:buChar char=""/>
+                <a:defRPr sz="1400" kern="1200" cap="none">
+                  <a:solidFill>
+                    <a:schemeClr val="bg2">
+                      <a:lumMod val="50000"/>
+                    </a:schemeClr>
+                  </a:solidFill>
+                  <a:effectLst/>
+                  <a:latin typeface="+mn-lt"/>
+                  <a:ea typeface="+mn-ea"/>
+                  <a:cs typeface="+mn-cs"/>
+                </a:defRPr>
+              </a:lvl5pPr>
+              <a:lvl6pPr marL="2514600" indent="-228600" algn="l" defTabSz="457200" rtl="0" eaLnBrk="1" latinLnBrk="0" hangingPunct="1">
+                <a:spcBef>
+                  <a:spcPct val="20000"/>
+                </a:spcBef>
+                <a:spcAft>
+                  <a:spcPts val="600"/>
+                </a:spcAft>
+                <a:buClr>
+                  <a:schemeClr val="tx1"/>
+                </a:buClr>
+                <a:buSzPct val="80000"/>
+                <a:buFont typeface="Wingdings 3" panose="05040102010807070707" pitchFamily="18" charset="2"/>
+                <a:buChar char=""/>
+                <a:defRPr sz="1400" kern="1200" cap="none">
+                  <a:solidFill>
+                    <a:schemeClr val="bg2">
+                      <a:lumMod val="50000"/>
+                    </a:schemeClr>
+                  </a:solidFill>
+                  <a:effectLst/>
+                  <a:latin typeface="+mn-lt"/>
+                  <a:ea typeface="+mn-ea"/>
+                  <a:cs typeface="+mn-cs"/>
+                </a:defRPr>
+              </a:lvl6pPr>
+              <a:lvl7pPr marL="2971800" indent="-228600" algn="l" defTabSz="457200" rtl="0" eaLnBrk="1" latinLnBrk="0" hangingPunct="1">
+                <a:spcBef>
+                  <a:spcPct val="20000"/>
+                </a:spcBef>
+                <a:spcAft>
+                  <a:spcPts val="600"/>
+                </a:spcAft>
+                <a:buClr>
+                  <a:schemeClr val="tx1"/>
+                </a:buClr>
+                <a:buSzPct val="80000"/>
+                <a:buFont typeface="Wingdings 3" panose="05040102010807070707" pitchFamily="18" charset="2"/>
+                <a:buChar char=""/>
+                <a:defRPr sz="1400" kern="1200" cap="none">
+                  <a:solidFill>
+                    <a:schemeClr val="bg2">
+                      <a:lumMod val="50000"/>
+                    </a:schemeClr>
+                  </a:solidFill>
+                  <a:effectLst/>
+                  <a:latin typeface="+mn-lt"/>
+                  <a:ea typeface="+mn-ea"/>
+                  <a:cs typeface="+mn-cs"/>
+                </a:defRPr>
+              </a:lvl7pPr>
+              <a:lvl8pPr marL="3429000" indent="-228600" algn="l" defTabSz="457200" rtl="0" eaLnBrk="1" latinLnBrk="0" hangingPunct="1">
+                <a:spcBef>
+                  <a:spcPct val="20000"/>
+                </a:spcBef>
+                <a:spcAft>
+                  <a:spcPts val="600"/>
+                </a:spcAft>
+                <a:buClr>
+                  <a:schemeClr val="tx1"/>
+                </a:buClr>
+                <a:buSzPct val="80000"/>
+                <a:buFont typeface="Wingdings 3" panose="05040102010807070707" pitchFamily="18" charset="2"/>
+                <a:buChar char=""/>
+                <a:defRPr sz="1400" kern="1200" cap="none">
+                  <a:solidFill>
+                    <a:schemeClr val="bg2">
+                      <a:lumMod val="50000"/>
+                    </a:schemeClr>
+                  </a:solidFill>
+                  <a:effectLst/>
+                  <a:latin typeface="+mn-lt"/>
+                  <a:ea typeface="+mn-ea"/>
+                  <a:cs typeface="+mn-cs"/>
+                </a:defRPr>
+              </a:lvl8pPr>
+              <a:lvl9pPr marL="3886200" indent="-228600" algn="l" defTabSz="457200" rtl="0" eaLnBrk="1" latinLnBrk="0" hangingPunct="1">
+                <a:spcBef>
+                  <a:spcPct val="20000"/>
+                </a:spcBef>
+                <a:spcAft>
+                  <a:spcPts val="600"/>
+                </a:spcAft>
+                <a:buClr>
+                  <a:schemeClr val="tx1"/>
+                </a:buClr>
+                <a:buSzPct val="80000"/>
+                <a:buFont typeface="Wingdings 3" panose="05040102010807070707" pitchFamily="18" charset="2"/>
+                <a:buChar char=""/>
+                <a:defRPr sz="1400" kern="1200" cap="none">
+                  <a:solidFill>
+                    <a:schemeClr val="bg2">
+                      <a:lumMod val="50000"/>
+                    </a:schemeClr>
+                  </a:solidFill>
+                  <a:effectLst/>
+                  <a:latin typeface="+mn-lt"/>
+                  <a:ea typeface="+mn-ea"/>
+                  <a:cs typeface="+mn-cs"/>
+                </a:defRPr>
+              </a:lvl9pPr>
+            </a:lstStyle>
+            <a:p>
+              <a:r>
+                <a:rPr lang="en-US" dirty="0"/>
+                <a:t>To make you R power-users in 2 hours.</a:t>
+              </a:r>
+            </a:p>
+            <a:p>
+              <a:r>
+                <a:rPr lang="en-US" dirty="0"/>
+                <a:t>To convince you that R is the one, true data science tool.</a:t>
+              </a:r>
+            </a:p>
+          </p:txBody>
+        </p:sp>
+      </p:grpSp>
     </p:spTree>
     <p:extLst>
       <p:ext uri="{BB962C8B-B14F-4D97-AF65-F5344CB8AC3E}">

</xml_diff>